<commit_message>
chalk, 404, and 500 error handling done
</commit_message>
<xml_diff>
--- a/My Understanding.pptx
+++ b/My Understanding.pptx
@@ -5,7 +5,7 @@
     <p:sldMasterId id="2147483660" r:id="rId1"/>
   </p:sldMasterIdLst>
   <p:notesMasterIdLst>
-    <p:notesMasterId r:id="rId31"/>
+    <p:notesMasterId r:id="rId34"/>
   </p:notesMasterIdLst>
   <p:sldIdLst>
     <p:sldId id="259" r:id="rId2"/>
@@ -37,6 +37,9 @@
     <p:sldId id="286" r:id="rId28"/>
     <p:sldId id="287" r:id="rId29"/>
     <p:sldId id="288" r:id="rId30"/>
+    <p:sldId id="289" r:id="rId31"/>
+    <p:sldId id="290" r:id="rId32"/>
+    <p:sldId id="291" r:id="rId33"/>
   </p:sldIdLst>
   <p:sldSz cx="14400213" cy="6858000"/>
   <p:notesSz cx="6858000" cy="9144000"/>
@@ -229,7 +232,7 @@
           <a:p>
             <a:fld id="{EC33A393-DAB2-4034-922D-E0C16E3D4877}" type="datetimeFigureOut">
               <a:rPr lang="en-IN" smtClean="0"/>
-              <a:t>12-10-2017</a:t>
+              <a:t>16-10-2017</a:t>
             </a:fld>
             <a:endParaRPr lang="en-IN"/>
           </a:p>
@@ -801,7 +804,7 @@
           <a:p>
             <a:fld id="{21283FD9-7D71-4B97-B325-4182E961AB8D}" type="datetimeFigureOut">
               <a:rPr lang="en-IN" smtClean="0"/>
-              <a:t>12-10-2017</a:t>
+              <a:t>16-10-2017</a:t>
             </a:fld>
             <a:endParaRPr lang="en-IN"/>
           </a:p>
@@ -971,7 +974,7 @@
           <a:p>
             <a:fld id="{21283FD9-7D71-4B97-B325-4182E961AB8D}" type="datetimeFigureOut">
               <a:rPr lang="en-IN" smtClean="0"/>
-              <a:t>12-10-2017</a:t>
+              <a:t>16-10-2017</a:t>
             </a:fld>
             <a:endParaRPr lang="en-IN"/>
           </a:p>
@@ -1151,7 +1154,7 @@
           <a:p>
             <a:fld id="{21283FD9-7D71-4B97-B325-4182E961AB8D}" type="datetimeFigureOut">
               <a:rPr lang="en-IN" smtClean="0"/>
-              <a:t>12-10-2017</a:t>
+              <a:t>16-10-2017</a:t>
             </a:fld>
             <a:endParaRPr lang="en-IN"/>
           </a:p>
@@ -1321,7 +1324,7 @@
           <a:p>
             <a:fld id="{21283FD9-7D71-4B97-B325-4182E961AB8D}" type="datetimeFigureOut">
               <a:rPr lang="en-IN" smtClean="0"/>
-              <a:t>12-10-2017</a:t>
+              <a:t>16-10-2017</a:t>
             </a:fld>
             <a:endParaRPr lang="en-IN"/>
           </a:p>
@@ -1567,7 +1570,7 @@
           <a:p>
             <a:fld id="{21283FD9-7D71-4B97-B325-4182E961AB8D}" type="datetimeFigureOut">
               <a:rPr lang="en-IN" smtClean="0"/>
-              <a:t>12-10-2017</a:t>
+              <a:t>16-10-2017</a:t>
             </a:fld>
             <a:endParaRPr lang="en-IN"/>
           </a:p>
@@ -1799,7 +1802,7 @@
           <a:p>
             <a:fld id="{21283FD9-7D71-4B97-B325-4182E961AB8D}" type="datetimeFigureOut">
               <a:rPr lang="en-IN" smtClean="0"/>
-              <a:t>12-10-2017</a:t>
+              <a:t>16-10-2017</a:t>
             </a:fld>
             <a:endParaRPr lang="en-IN"/>
           </a:p>
@@ -2166,7 +2169,7 @@
           <a:p>
             <a:fld id="{21283FD9-7D71-4B97-B325-4182E961AB8D}" type="datetimeFigureOut">
               <a:rPr lang="en-IN" smtClean="0"/>
-              <a:t>12-10-2017</a:t>
+              <a:t>16-10-2017</a:t>
             </a:fld>
             <a:endParaRPr lang="en-IN"/>
           </a:p>
@@ -2284,7 +2287,7 @@
           <a:p>
             <a:fld id="{21283FD9-7D71-4B97-B325-4182E961AB8D}" type="datetimeFigureOut">
               <a:rPr lang="en-IN" smtClean="0"/>
-              <a:t>12-10-2017</a:t>
+              <a:t>16-10-2017</a:t>
             </a:fld>
             <a:endParaRPr lang="en-IN"/>
           </a:p>
@@ -2379,7 +2382,7 @@
           <a:p>
             <a:fld id="{21283FD9-7D71-4B97-B325-4182E961AB8D}" type="datetimeFigureOut">
               <a:rPr lang="en-IN" smtClean="0"/>
-              <a:t>12-10-2017</a:t>
+              <a:t>16-10-2017</a:t>
             </a:fld>
             <a:endParaRPr lang="en-IN"/>
           </a:p>
@@ -2656,7 +2659,7 @@
           <a:p>
             <a:fld id="{21283FD9-7D71-4B97-B325-4182E961AB8D}" type="datetimeFigureOut">
               <a:rPr lang="en-IN" smtClean="0"/>
-              <a:t>12-10-2017</a:t>
+              <a:t>16-10-2017</a:t>
             </a:fld>
             <a:endParaRPr lang="en-IN"/>
           </a:p>
@@ -2913,7 +2916,7 @@
           <a:p>
             <a:fld id="{21283FD9-7D71-4B97-B325-4182E961AB8D}" type="datetimeFigureOut">
               <a:rPr lang="en-IN" smtClean="0"/>
-              <a:t>12-10-2017</a:t>
+              <a:t>16-10-2017</a:t>
             </a:fld>
             <a:endParaRPr lang="en-IN"/>
           </a:p>
@@ -3126,7 +3129,7 @@
           <a:p>
             <a:fld id="{21283FD9-7D71-4B97-B325-4182E961AB8D}" type="datetimeFigureOut">
               <a:rPr lang="en-IN" smtClean="0"/>
-              <a:t>12-10-2017</a:t>
+              <a:t>16-10-2017</a:t>
             </a:fld>
             <a:endParaRPr lang="en-IN"/>
           </a:p>
@@ -26390,6 +26393,1835 @@
 </p:sld>
 </file>
 
+<file path=ppt/slides/slide30.xml><?xml version="1.0" encoding="utf-8"?>
+<p:sld xmlns:a="http://schemas.openxmlformats.org/drawingml/2006/main" xmlns:r="http://schemas.openxmlformats.org/officeDocument/2006/relationships" xmlns:p="http://schemas.openxmlformats.org/presentationml/2006/main">
+  <p:cSld>
+    <p:spTree>
+      <p:nvGrpSpPr>
+        <p:cNvPr id="1" name=""/>
+        <p:cNvGrpSpPr/>
+        <p:nvPr/>
+      </p:nvGrpSpPr>
+      <p:grpSpPr>
+        <a:xfrm>
+          <a:off x="0" y="0"/>
+          <a:ext cx="0" cy="0"/>
+          <a:chOff x="0" y="0"/>
+          <a:chExt cx="0" cy="0"/>
+        </a:xfrm>
+      </p:grpSpPr>
+      <p:sp>
+        <p:nvSpPr>
+          <p:cNvPr id="2" name="Rectangle 1">
+            <a:extLst>
+              <a:ext uri="{FF2B5EF4-FFF2-40B4-BE49-F238E27FC236}">
+                <a16:creationId xmlns:a16="http://schemas.microsoft.com/office/drawing/2014/main" id="{89C7697E-47C6-4B08-B239-205A00C607A2}"/>
+              </a:ext>
+            </a:extLst>
+          </p:cNvPr>
+          <p:cNvSpPr/>
+          <p:nvPr/>
+        </p:nvSpPr>
+        <p:spPr>
+          <a:xfrm>
+            <a:off x="1370689" y="1976923"/>
+            <a:ext cx="1473594" cy="1434906"/>
+          </a:xfrm>
+          <a:prstGeom prst="rect">
+            <a:avLst/>
+          </a:prstGeom>
+          <a:solidFill>
+            <a:srgbClr val="00B050"/>
+          </a:solidFill>
+          <a:ln>
+            <a:noFill/>
+          </a:ln>
+        </p:spPr>
+        <p:style>
+          <a:lnRef idx="2">
+            <a:schemeClr val="accent1">
+              <a:shade val="50000"/>
+            </a:schemeClr>
+          </a:lnRef>
+          <a:fillRef idx="1">
+            <a:schemeClr val="accent1"/>
+          </a:fillRef>
+          <a:effectRef idx="0">
+            <a:schemeClr val="accent1"/>
+          </a:effectRef>
+          <a:fontRef idx="minor">
+            <a:schemeClr val="lt1"/>
+          </a:fontRef>
+        </p:style>
+        <p:txBody>
+          <a:bodyPr rtlCol="0" anchor="ctr"/>
+          <a:lstStyle/>
+          <a:p>
+            <a:pPr algn="ctr"/>
+            <a:endParaRPr lang="en-IN"/>
+          </a:p>
+        </p:txBody>
+      </p:sp>
+      <p:sp>
+        <p:nvSpPr>
+          <p:cNvPr id="3" name="Rectangle 2">
+            <a:extLst>
+              <a:ext uri="{FF2B5EF4-FFF2-40B4-BE49-F238E27FC236}">
+                <a16:creationId xmlns:a16="http://schemas.microsoft.com/office/drawing/2014/main" id="{B120DFA5-69BB-4C77-8C4C-C52B50DBB569}"/>
+              </a:ext>
+            </a:extLst>
+          </p:cNvPr>
+          <p:cNvSpPr/>
+          <p:nvPr/>
+        </p:nvSpPr>
+        <p:spPr>
+          <a:xfrm>
+            <a:off x="1370689" y="2694376"/>
+            <a:ext cx="1167620" cy="717453"/>
+          </a:xfrm>
+          <a:prstGeom prst="rect">
+            <a:avLst/>
+          </a:prstGeom>
+          <a:solidFill>
+            <a:schemeClr val="accent2">
+              <a:lumMod val="75000"/>
+            </a:schemeClr>
+          </a:solidFill>
+          <a:ln>
+            <a:noFill/>
+          </a:ln>
+        </p:spPr>
+        <p:style>
+          <a:lnRef idx="2">
+            <a:schemeClr val="accent1">
+              <a:shade val="50000"/>
+            </a:schemeClr>
+          </a:lnRef>
+          <a:fillRef idx="1">
+            <a:schemeClr val="accent1"/>
+          </a:fillRef>
+          <a:effectRef idx="0">
+            <a:schemeClr val="accent1"/>
+          </a:effectRef>
+          <a:fontRef idx="minor">
+            <a:schemeClr val="lt1"/>
+          </a:fontRef>
+        </p:style>
+        <p:txBody>
+          <a:bodyPr rtlCol="0" anchor="ctr"/>
+          <a:lstStyle/>
+          <a:p>
+            <a:pPr algn="ctr"/>
+            <a:r>
+              <a:rPr lang="en-IN"/>
+              <a:t>User Mgmt</a:t>
+            </a:r>
+          </a:p>
+        </p:txBody>
+      </p:sp>
+      <p:sp>
+        <p:nvSpPr>
+          <p:cNvPr id="4" name="Rectangle 3">
+            <a:extLst>
+              <a:ext uri="{FF2B5EF4-FFF2-40B4-BE49-F238E27FC236}">
+                <a16:creationId xmlns:a16="http://schemas.microsoft.com/office/drawing/2014/main" id="{CDB37928-000B-4EE7-B721-1C7F677AAC96}"/>
+              </a:ext>
+            </a:extLst>
+          </p:cNvPr>
+          <p:cNvSpPr/>
+          <p:nvPr/>
+        </p:nvSpPr>
+        <p:spPr>
+          <a:xfrm>
+            <a:off x="973281" y="3411829"/>
+            <a:ext cx="1871003" cy="717453"/>
+          </a:xfrm>
+          <a:prstGeom prst="rect">
+            <a:avLst/>
+          </a:prstGeom>
+          <a:ln>
+            <a:noFill/>
+          </a:ln>
+        </p:spPr>
+        <p:style>
+          <a:lnRef idx="2">
+            <a:schemeClr val="accent1">
+              <a:shade val="50000"/>
+            </a:schemeClr>
+          </a:lnRef>
+          <a:fillRef idx="1">
+            <a:schemeClr val="accent1"/>
+          </a:fillRef>
+          <a:effectRef idx="0">
+            <a:schemeClr val="accent1"/>
+          </a:effectRef>
+          <a:fontRef idx="minor">
+            <a:schemeClr val="lt1"/>
+          </a:fontRef>
+        </p:style>
+        <p:txBody>
+          <a:bodyPr rtlCol="0" anchor="ctr"/>
+          <a:lstStyle/>
+          <a:p>
+            <a:pPr algn="ctr"/>
+            <a:r>
+              <a:rPr lang="en-IN"/>
+              <a:t>Templates</a:t>
+            </a:r>
+          </a:p>
+        </p:txBody>
+      </p:sp>
+      <p:sp>
+        <p:nvSpPr>
+          <p:cNvPr id="5" name="Rectangle 4">
+            <a:extLst>
+              <a:ext uri="{FF2B5EF4-FFF2-40B4-BE49-F238E27FC236}">
+                <a16:creationId xmlns:a16="http://schemas.microsoft.com/office/drawing/2014/main" id="{A9C088C1-C896-499B-BFA8-EAEFDC59DD36}"/>
+              </a:ext>
+            </a:extLst>
+          </p:cNvPr>
+          <p:cNvSpPr/>
+          <p:nvPr/>
+        </p:nvSpPr>
+        <p:spPr>
+          <a:xfrm>
+            <a:off x="973280" y="4101148"/>
+            <a:ext cx="1871003" cy="717453"/>
+          </a:xfrm>
+          <a:prstGeom prst="rect">
+            <a:avLst/>
+          </a:prstGeom>
+          <a:solidFill>
+            <a:schemeClr val="tx1">
+              <a:lumMod val="50000"/>
+              <a:lumOff val="50000"/>
+            </a:schemeClr>
+          </a:solidFill>
+          <a:ln>
+            <a:noFill/>
+          </a:ln>
+        </p:spPr>
+        <p:style>
+          <a:lnRef idx="2">
+            <a:schemeClr val="accent1">
+              <a:shade val="50000"/>
+            </a:schemeClr>
+          </a:lnRef>
+          <a:fillRef idx="1">
+            <a:schemeClr val="accent1"/>
+          </a:fillRef>
+          <a:effectRef idx="0">
+            <a:schemeClr val="accent1"/>
+          </a:effectRef>
+          <a:fontRef idx="minor">
+            <a:schemeClr val="lt1"/>
+          </a:fontRef>
+        </p:style>
+        <p:txBody>
+          <a:bodyPr rtlCol="0" anchor="ctr"/>
+          <a:lstStyle/>
+          <a:p>
+            <a:pPr algn="ctr"/>
+            <a:r>
+              <a:rPr lang="en-IN"/>
+              <a:t>MongoDB</a:t>
+            </a:r>
+          </a:p>
+          <a:p>
+            <a:pPr algn="ctr"/>
+            <a:r>
+              <a:rPr lang="en-IN"/>
+              <a:t>(Cloud)</a:t>
+            </a:r>
+          </a:p>
+        </p:txBody>
+      </p:sp>
+      <p:sp>
+        <p:nvSpPr>
+          <p:cNvPr id="6" name="TextBox 5">
+            <a:extLst>
+              <a:ext uri="{FF2B5EF4-FFF2-40B4-BE49-F238E27FC236}">
+                <a16:creationId xmlns:a16="http://schemas.microsoft.com/office/drawing/2014/main" id="{B9EEFF51-9155-45E1-A45F-3EC5EC63733B}"/>
+              </a:ext>
+            </a:extLst>
+          </p:cNvPr>
+          <p:cNvSpPr txBox="1"/>
+          <p:nvPr/>
+        </p:nvSpPr>
+        <p:spPr>
+          <a:xfrm>
+            <a:off x="1462117" y="2165051"/>
+            <a:ext cx="1290738" cy="369332"/>
+          </a:xfrm>
+          <a:prstGeom prst="rect">
+            <a:avLst/>
+          </a:prstGeom>
+          <a:noFill/>
+        </p:spPr>
+        <p:txBody>
+          <a:bodyPr wrap="none" rtlCol="0">
+            <a:spAutoFit/>
+          </a:bodyPr>
+          <a:lstStyle/>
+          <a:p>
+            <a:r>
+              <a:rPr lang="en-IN">
+                <a:solidFill>
+                  <a:schemeClr val="bg1"/>
+                </a:solidFill>
+              </a:rPr>
+              <a:t>Story Mgmt</a:t>
+            </a:r>
+          </a:p>
+        </p:txBody>
+      </p:sp>
+      <p:sp>
+        <p:nvSpPr>
+          <p:cNvPr id="7" name="Rectangle 6">
+            <a:extLst>
+              <a:ext uri="{FF2B5EF4-FFF2-40B4-BE49-F238E27FC236}">
+                <a16:creationId xmlns:a16="http://schemas.microsoft.com/office/drawing/2014/main" id="{65A1458F-6CD1-4BD2-B2E0-D56F87ED0FBE}"/>
+              </a:ext>
+            </a:extLst>
+          </p:cNvPr>
+          <p:cNvSpPr/>
+          <p:nvPr/>
+        </p:nvSpPr>
+        <p:spPr>
+          <a:xfrm>
+            <a:off x="976791" y="1976923"/>
+            <a:ext cx="397408" cy="1434906"/>
+          </a:xfrm>
+          <a:prstGeom prst="rect">
+            <a:avLst/>
+          </a:prstGeom>
+          <a:solidFill>
+            <a:schemeClr val="accent4">
+              <a:lumMod val="60000"/>
+              <a:lumOff val="40000"/>
+            </a:schemeClr>
+          </a:solidFill>
+          <a:ln>
+            <a:noFill/>
+          </a:ln>
+        </p:spPr>
+        <p:style>
+          <a:lnRef idx="2">
+            <a:schemeClr val="accent1">
+              <a:shade val="50000"/>
+            </a:schemeClr>
+          </a:lnRef>
+          <a:fillRef idx="1">
+            <a:schemeClr val="accent1"/>
+          </a:fillRef>
+          <a:effectRef idx="0">
+            <a:schemeClr val="accent1"/>
+          </a:effectRef>
+          <a:fontRef idx="minor">
+            <a:schemeClr val="lt1"/>
+          </a:fontRef>
+        </p:style>
+        <p:txBody>
+          <a:bodyPr rtlCol="0" anchor="ctr"/>
+          <a:lstStyle/>
+          <a:p>
+            <a:pPr algn="ctr"/>
+            <a:endParaRPr lang="en-IN"/>
+          </a:p>
+        </p:txBody>
+      </p:sp>
+      <p:sp>
+        <p:nvSpPr>
+          <p:cNvPr id="8" name="TextBox 7">
+            <a:extLst>
+              <a:ext uri="{FF2B5EF4-FFF2-40B4-BE49-F238E27FC236}">
+                <a16:creationId xmlns:a16="http://schemas.microsoft.com/office/drawing/2014/main" id="{0FF87D8F-D354-4C0E-A001-23359228901B}"/>
+              </a:ext>
+            </a:extLst>
+          </p:cNvPr>
+          <p:cNvSpPr txBox="1"/>
+          <p:nvPr/>
+        </p:nvSpPr>
+        <p:spPr>
+          <a:xfrm rot="16200000">
+            <a:off x="695207" y="2507536"/>
+            <a:ext cx="932499" cy="369332"/>
+          </a:xfrm>
+          <a:prstGeom prst="rect">
+            <a:avLst/>
+          </a:prstGeom>
+          <a:noFill/>
+        </p:spPr>
+        <p:txBody>
+          <a:bodyPr wrap="none" rtlCol="0">
+            <a:spAutoFit/>
+          </a:bodyPr>
+          <a:lstStyle/>
+          <a:p>
+            <a:r>
+              <a:rPr lang="en-IN"/>
+              <a:t>Others*</a:t>
+            </a:r>
+          </a:p>
+        </p:txBody>
+      </p:sp>
+      <p:sp>
+        <p:nvSpPr>
+          <p:cNvPr id="9" name="TextBox 8">
+            <a:extLst>
+              <a:ext uri="{FF2B5EF4-FFF2-40B4-BE49-F238E27FC236}">
+                <a16:creationId xmlns:a16="http://schemas.microsoft.com/office/drawing/2014/main" id="{F727467C-3857-4516-A251-9BF424BB23AB}"/>
+              </a:ext>
+            </a:extLst>
+          </p:cNvPr>
+          <p:cNvSpPr txBox="1"/>
+          <p:nvPr/>
+        </p:nvSpPr>
+        <p:spPr>
+          <a:xfrm>
+            <a:off x="797321" y="5146206"/>
+            <a:ext cx="2260812" cy="307777"/>
+          </a:xfrm>
+          <a:prstGeom prst="rect">
+            <a:avLst/>
+          </a:prstGeom>
+          <a:noFill/>
+        </p:spPr>
+        <p:txBody>
+          <a:bodyPr wrap="none" rtlCol="0">
+            <a:spAutoFit/>
+          </a:bodyPr>
+          <a:lstStyle/>
+          <a:p>
+            <a:r>
+              <a:rPr lang="en-IN" sz="1400"/>
+              <a:t>Error Mgmt (404, 500,Chalk)</a:t>
+            </a:r>
+          </a:p>
+        </p:txBody>
+      </p:sp>
+      <p:sp>
+        <p:nvSpPr>
+          <p:cNvPr id="10" name="TextBox 9">
+            <a:extLst>
+              <a:ext uri="{FF2B5EF4-FFF2-40B4-BE49-F238E27FC236}">
+                <a16:creationId xmlns:a16="http://schemas.microsoft.com/office/drawing/2014/main" id="{06D9F812-F890-407A-8D26-9948CB987CF8}"/>
+              </a:ext>
+            </a:extLst>
+          </p:cNvPr>
+          <p:cNvSpPr txBox="1"/>
+          <p:nvPr/>
+        </p:nvSpPr>
+        <p:spPr>
+          <a:xfrm>
+            <a:off x="155809" y="30475"/>
+            <a:ext cx="1517812" cy="523220"/>
+          </a:xfrm>
+          <a:prstGeom prst="rect">
+            <a:avLst/>
+          </a:prstGeom>
+          <a:solidFill>
+            <a:srgbClr val="FFFF00"/>
+          </a:solidFill>
+        </p:spPr>
+        <p:txBody>
+          <a:bodyPr wrap="square" rtlCol="0">
+            <a:spAutoFit/>
+          </a:bodyPr>
+          <a:lstStyle/>
+          <a:p>
+            <a:r>
+              <a:rPr lang="en-IN" sz="2800" u="sng">
+                <a:latin typeface="Roboto" panose="02000000000000000000" pitchFamily="2" charset="0"/>
+                <a:ea typeface="Roboto" panose="02000000000000000000" pitchFamily="2" charset="0"/>
+              </a:rPr>
+              <a:t>Phase 5</a:t>
+            </a:r>
+          </a:p>
+        </p:txBody>
+      </p:sp>
+      <p:sp>
+        <p:nvSpPr>
+          <p:cNvPr id="11" name="TextBox 10">
+            <a:extLst>
+              <a:ext uri="{FF2B5EF4-FFF2-40B4-BE49-F238E27FC236}">
+                <a16:creationId xmlns:a16="http://schemas.microsoft.com/office/drawing/2014/main" id="{71AACA41-0E3E-4D95-AAD5-A6B228D82B2E}"/>
+              </a:ext>
+            </a:extLst>
+          </p:cNvPr>
+          <p:cNvSpPr txBox="1"/>
+          <p:nvPr/>
+        </p:nvSpPr>
+        <p:spPr>
+          <a:xfrm>
+            <a:off x="277426" y="5746743"/>
+            <a:ext cx="5561413" cy="523220"/>
+          </a:xfrm>
+          <a:prstGeom prst="rect">
+            <a:avLst/>
+          </a:prstGeom>
+          <a:noFill/>
+        </p:spPr>
+        <p:txBody>
+          <a:bodyPr wrap="square" rtlCol="0">
+            <a:spAutoFit/>
+          </a:bodyPr>
+          <a:lstStyle/>
+          <a:p>
+            <a:r>
+              <a:rPr lang="en-IN" sz="1400">
+                <a:latin typeface="Roboto" panose="02000000000000000000" pitchFamily="2" charset="0"/>
+                <a:ea typeface="Roboto" panose="02000000000000000000" pitchFamily="2" charset="0"/>
+              </a:rPr>
+              <a:t>Add comments shall be postponed as an exercise</a:t>
+            </a:r>
+          </a:p>
+          <a:p>
+            <a:r>
+              <a:rPr lang="en-IN" sz="1400">
+                <a:latin typeface="Roboto" panose="02000000000000000000" pitchFamily="2" charset="0"/>
+                <a:ea typeface="Roboto" panose="02000000000000000000" pitchFamily="2" charset="0"/>
+              </a:rPr>
+              <a:t>(actually not feeling well while doing this, so want to wrap up)</a:t>
+            </a:r>
+          </a:p>
+        </p:txBody>
+      </p:sp>
+      <p:sp>
+        <p:nvSpPr>
+          <p:cNvPr id="12" name="TextBox 11">
+            <a:extLst>
+              <a:ext uri="{FF2B5EF4-FFF2-40B4-BE49-F238E27FC236}">
+                <a16:creationId xmlns:a16="http://schemas.microsoft.com/office/drawing/2014/main" id="{8B7336B3-3C75-42EE-8231-FE65E3E4C482}"/>
+              </a:ext>
+            </a:extLst>
+          </p:cNvPr>
+          <p:cNvSpPr txBox="1"/>
+          <p:nvPr/>
+        </p:nvSpPr>
+        <p:spPr>
+          <a:xfrm>
+            <a:off x="5530464" y="852499"/>
+            <a:ext cx="5561413" cy="5047536"/>
+          </a:xfrm>
+          <a:prstGeom prst="rect">
+            <a:avLst/>
+          </a:prstGeom>
+          <a:noFill/>
+        </p:spPr>
+        <p:txBody>
+          <a:bodyPr wrap="square" rtlCol="0">
+            <a:spAutoFit/>
+          </a:bodyPr>
+          <a:lstStyle/>
+          <a:p>
+            <a:r>
+              <a:rPr lang="en-IN" sz="1400" b="1" u="sng">
+                <a:latin typeface="Roboto" panose="02000000000000000000" pitchFamily="2" charset="0"/>
+                <a:ea typeface="Roboto" panose="02000000000000000000" pitchFamily="2" charset="0"/>
+              </a:rPr>
+              <a:t>Summary:</a:t>
+            </a:r>
+          </a:p>
+          <a:p>
+            <a:endParaRPr lang="en-IN" sz="1400">
+              <a:latin typeface="Roboto" panose="02000000000000000000" pitchFamily="2" charset="0"/>
+              <a:ea typeface="Roboto" panose="02000000000000000000" pitchFamily="2" charset="0"/>
+            </a:endParaRPr>
+          </a:p>
+          <a:p>
+            <a:r>
+              <a:rPr lang="en-IN" sz="1400">
+                <a:latin typeface="Roboto" panose="02000000000000000000" pitchFamily="2" charset="0"/>
+                <a:ea typeface="Roboto" panose="02000000000000000000" pitchFamily="2" charset="0"/>
+              </a:rPr>
+              <a:t>5.1. We could use logout page template for 404 &amp; 500. Why?</a:t>
+            </a:r>
+          </a:p>
+          <a:p>
+            <a:r>
+              <a:rPr lang="en-IN" sz="1400">
+                <a:latin typeface="Roboto" panose="02000000000000000000" pitchFamily="2" charset="0"/>
+                <a:ea typeface="Roboto" panose="02000000000000000000" pitchFamily="2" charset="0"/>
+              </a:rPr>
+              <a:t>We want to avoid any further error that might arise from log check in sidebar.ejs. </a:t>
+            </a:r>
+          </a:p>
+          <a:p>
+            <a:endParaRPr lang="en-IN" sz="1400">
+              <a:latin typeface="Roboto" panose="02000000000000000000" pitchFamily="2" charset="0"/>
+              <a:ea typeface="Roboto" panose="02000000000000000000" pitchFamily="2" charset="0"/>
+            </a:endParaRPr>
+          </a:p>
+          <a:p>
+            <a:r>
+              <a:rPr lang="en-IN" sz="1400">
+                <a:latin typeface="Roboto" panose="02000000000000000000" pitchFamily="2" charset="0"/>
+                <a:ea typeface="Roboto" panose="02000000000000000000" pitchFamily="2" charset="0"/>
+              </a:rPr>
+              <a:t>5.2. During normal routing, we just render. But this error handling, we</a:t>
+            </a:r>
+          </a:p>
+          <a:p>
+            <a:r>
+              <a:rPr lang="en-IN" sz="1400">
+                <a:latin typeface="Roboto" panose="02000000000000000000" pitchFamily="2" charset="0"/>
+                <a:ea typeface="Roboto" panose="02000000000000000000" pitchFamily="2" charset="0"/>
+              </a:rPr>
+              <a:t>Need to inform client, the http status (which otherwise receive 200 for normal). So we set the status and send as follows</a:t>
+            </a:r>
+          </a:p>
+          <a:p>
+            <a:endParaRPr lang="en-IN" sz="1400">
+              <a:latin typeface="Roboto" panose="02000000000000000000" pitchFamily="2" charset="0"/>
+              <a:ea typeface="Roboto" panose="02000000000000000000" pitchFamily="2" charset="0"/>
+            </a:endParaRPr>
+          </a:p>
+          <a:p>
+            <a:r>
+              <a:rPr lang="en-IN" sz="1400">
+                <a:solidFill>
+                  <a:srgbClr val="3333CC"/>
+                </a:solidFill>
+                <a:latin typeface="Roboto" panose="02000000000000000000" pitchFamily="2" charset="0"/>
+                <a:ea typeface="Roboto" panose="02000000000000000000" pitchFamily="2" charset="0"/>
+              </a:rPr>
+              <a:t>Response.status(404).render(“404”); in app.js</a:t>
+            </a:r>
+          </a:p>
+          <a:p>
+            <a:endParaRPr lang="en-IN" sz="1400">
+              <a:solidFill>
+                <a:srgbClr val="3333CC"/>
+              </a:solidFill>
+              <a:latin typeface="Roboto" panose="02000000000000000000" pitchFamily="2" charset="0"/>
+              <a:ea typeface="Roboto" panose="02000000000000000000" pitchFamily="2" charset="0"/>
+            </a:endParaRPr>
+          </a:p>
+          <a:p>
+            <a:r>
+              <a:rPr lang="en-IN" sz="1400">
+                <a:solidFill>
+                  <a:srgbClr val="3333CC"/>
+                </a:solidFill>
+                <a:latin typeface="Roboto" panose="02000000000000000000" pitchFamily="2" charset="0"/>
+                <a:ea typeface="Roboto" panose="02000000000000000000" pitchFamily="2" charset="0"/>
+              </a:rPr>
+              <a:t>Response.status(500).render(“500”) in app.js &amp; error location</a:t>
+            </a:r>
+          </a:p>
+          <a:p>
+            <a:endParaRPr lang="en-IN" sz="1400">
+              <a:latin typeface="Roboto" panose="02000000000000000000" pitchFamily="2" charset="0"/>
+              <a:ea typeface="Roboto" panose="02000000000000000000" pitchFamily="2" charset="0"/>
+            </a:endParaRPr>
+          </a:p>
+          <a:p>
+            <a:r>
+              <a:rPr lang="en-IN" sz="1400">
+                <a:latin typeface="Roboto" panose="02000000000000000000" pitchFamily="2" charset="0"/>
+                <a:ea typeface="Roboto" panose="02000000000000000000" pitchFamily="2" charset="0"/>
+              </a:rPr>
+              <a:t>5.3. These routing in app.js should be placed as last of all routing. </a:t>
+            </a:r>
+          </a:p>
+          <a:p>
+            <a:endParaRPr lang="en-IN" sz="1400">
+              <a:latin typeface="Roboto" panose="02000000000000000000" pitchFamily="2" charset="0"/>
+              <a:ea typeface="Roboto" panose="02000000000000000000" pitchFamily="2" charset="0"/>
+            </a:endParaRPr>
+          </a:p>
+          <a:p>
+            <a:r>
+              <a:rPr lang="en-IN" sz="1400">
+                <a:latin typeface="Roboto" panose="02000000000000000000" pitchFamily="2" charset="0"/>
+                <a:ea typeface="Roboto" panose="02000000000000000000" pitchFamily="2" charset="0"/>
+              </a:rPr>
+              <a:t>5.4. For now for demo, </a:t>
+            </a:r>
+          </a:p>
+          <a:p>
+            <a:r>
+              <a:rPr lang="en-IN" sz="1400">
+                <a:latin typeface="Roboto" panose="02000000000000000000" pitchFamily="2" charset="0"/>
+                <a:ea typeface="Roboto" panose="02000000000000000000" pitchFamily="2" charset="0"/>
+              </a:rPr>
+              <a:t>	DB error for saving story : 500</a:t>
+            </a:r>
+          </a:p>
+          <a:p>
+            <a:r>
+              <a:rPr lang="en-IN" sz="1400">
+                <a:latin typeface="Roboto" panose="02000000000000000000" pitchFamily="2" charset="0"/>
+                <a:ea typeface="Roboto" panose="02000000000000000000" pitchFamily="2" charset="0"/>
+              </a:rPr>
+              <a:t>	DB connection: chalk</a:t>
+            </a:r>
+          </a:p>
+          <a:p>
+            <a:endParaRPr lang="en-IN" sz="1400">
+              <a:latin typeface="Roboto" panose="02000000000000000000" pitchFamily="2" charset="0"/>
+              <a:ea typeface="Roboto" panose="02000000000000000000" pitchFamily="2" charset="0"/>
+            </a:endParaRPr>
+          </a:p>
+          <a:p>
+            <a:r>
+              <a:rPr lang="en-IN" sz="1400">
+                <a:latin typeface="Roboto" panose="02000000000000000000" pitchFamily="2" charset="0"/>
+                <a:ea typeface="Roboto" panose="02000000000000000000" pitchFamily="2" charset="0"/>
+              </a:rPr>
+              <a:t>5.5. MongoDB using online cloud service. And then Heroku deployment.</a:t>
+            </a:r>
+          </a:p>
+        </p:txBody>
+      </p:sp>
+    </p:spTree>
+    <p:extLst>
+      <p:ext uri="{BB962C8B-B14F-4D97-AF65-F5344CB8AC3E}">
+        <p14:creationId xmlns:p14="http://schemas.microsoft.com/office/powerpoint/2010/main" val="658212983"/>
+      </p:ext>
+    </p:extLst>
+  </p:cSld>
+  <p:clrMapOvr>
+    <a:masterClrMapping/>
+  </p:clrMapOvr>
+</p:sld>
+</file>
+
+<file path=ppt/slides/slide31.xml><?xml version="1.0" encoding="utf-8"?>
+<p:sld xmlns:a="http://schemas.openxmlformats.org/drawingml/2006/main" xmlns:r="http://schemas.openxmlformats.org/officeDocument/2006/relationships" xmlns:p="http://schemas.openxmlformats.org/presentationml/2006/main">
+  <p:cSld>
+    <p:spTree>
+      <p:nvGrpSpPr>
+        <p:cNvPr id="1" name=""/>
+        <p:cNvGrpSpPr/>
+        <p:nvPr/>
+      </p:nvGrpSpPr>
+      <p:grpSpPr>
+        <a:xfrm>
+          <a:off x="0" y="0"/>
+          <a:ext cx="0" cy="0"/>
+          <a:chOff x="0" y="0"/>
+          <a:chExt cx="0" cy="0"/>
+        </a:xfrm>
+      </p:grpSpPr>
+      <p:sp>
+        <p:nvSpPr>
+          <p:cNvPr id="10" name="TextBox 9">
+            <a:extLst>
+              <a:ext uri="{FF2B5EF4-FFF2-40B4-BE49-F238E27FC236}">
+                <a16:creationId xmlns:a16="http://schemas.microsoft.com/office/drawing/2014/main" id="{06D9F812-F890-407A-8D26-9948CB987CF8}"/>
+              </a:ext>
+            </a:extLst>
+          </p:cNvPr>
+          <p:cNvSpPr txBox="1"/>
+          <p:nvPr/>
+        </p:nvSpPr>
+        <p:spPr>
+          <a:xfrm>
+            <a:off x="155809" y="30475"/>
+            <a:ext cx="1517812" cy="523220"/>
+          </a:xfrm>
+          <a:prstGeom prst="rect">
+            <a:avLst/>
+          </a:prstGeom>
+          <a:solidFill>
+            <a:srgbClr val="FFFF00"/>
+          </a:solidFill>
+        </p:spPr>
+        <p:txBody>
+          <a:bodyPr wrap="square" rtlCol="0">
+            <a:spAutoFit/>
+          </a:bodyPr>
+          <a:lstStyle/>
+          <a:p>
+            <a:r>
+              <a:rPr lang="en-IN" sz="2800" u="sng">
+                <a:latin typeface="Roboto" panose="02000000000000000000" pitchFamily="2" charset="0"/>
+                <a:ea typeface="Roboto" panose="02000000000000000000" pitchFamily="2" charset="0"/>
+              </a:rPr>
+              <a:t>Phase 5</a:t>
+            </a:r>
+          </a:p>
+        </p:txBody>
+      </p:sp>
+      <p:sp>
+        <p:nvSpPr>
+          <p:cNvPr id="12" name="TextBox 11">
+            <a:extLst>
+              <a:ext uri="{FF2B5EF4-FFF2-40B4-BE49-F238E27FC236}">
+                <a16:creationId xmlns:a16="http://schemas.microsoft.com/office/drawing/2014/main" id="{8B7336B3-3C75-42EE-8231-FE65E3E4C482}"/>
+              </a:ext>
+            </a:extLst>
+          </p:cNvPr>
+          <p:cNvSpPr txBox="1"/>
+          <p:nvPr/>
+        </p:nvSpPr>
+        <p:spPr>
+          <a:xfrm>
+            <a:off x="265737" y="861735"/>
+            <a:ext cx="5561413" cy="4401205"/>
+          </a:xfrm>
+          <a:prstGeom prst="rect">
+            <a:avLst/>
+          </a:prstGeom>
+          <a:noFill/>
+        </p:spPr>
+        <p:txBody>
+          <a:bodyPr wrap="square" rtlCol="0">
+            <a:spAutoFit/>
+          </a:bodyPr>
+          <a:lstStyle/>
+          <a:p>
+            <a:r>
+              <a:rPr lang="en-IN" sz="1400" b="1" u="sng">
+                <a:latin typeface="Roboto" panose="02000000000000000000" pitchFamily="2" charset="0"/>
+                <a:ea typeface="Roboto" panose="02000000000000000000" pitchFamily="2" charset="0"/>
+              </a:rPr>
+              <a:t>Summary:</a:t>
+            </a:r>
+          </a:p>
+          <a:p>
+            <a:endParaRPr lang="en-IN" sz="1400">
+              <a:latin typeface="Roboto" panose="02000000000000000000" pitchFamily="2" charset="0"/>
+              <a:ea typeface="Roboto" panose="02000000000000000000" pitchFamily="2" charset="0"/>
+            </a:endParaRPr>
+          </a:p>
+          <a:p>
+            <a:r>
+              <a:rPr lang="en-IN" sz="1400">
+                <a:latin typeface="Roboto" panose="02000000000000000000" pitchFamily="2" charset="0"/>
+                <a:ea typeface="Roboto" panose="02000000000000000000" pitchFamily="2" charset="0"/>
+              </a:rPr>
+              <a:t>5.1. We could use logout page template for 404 &amp; 500. Why?</a:t>
+            </a:r>
+          </a:p>
+          <a:p>
+            <a:r>
+              <a:rPr lang="en-IN" sz="1400">
+                <a:latin typeface="Roboto" panose="02000000000000000000" pitchFamily="2" charset="0"/>
+                <a:ea typeface="Roboto" panose="02000000000000000000" pitchFamily="2" charset="0"/>
+              </a:rPr>
+              <a:t>We want to avoid any further error that might arise from log check in sidebar.ejs. </a:t>
+            </a:r>
+          </a:p>
+          <a:p>
+            <a:endParaRPr lang="en-IN" sz="1400">
+              <a:latin typeface="Roboto" panose="02000000000000000000" pitchFamily="2" charset="0"/>
+              <a:ea typeface="Roboto" panose="02000000000000000000" pitchFamily="2" charset="0"/>
+            </a:endParaRPr>
+          </a:p>
+          <a:p>
+            <a:r>
+              <a:rPr lang="en-IN" sz="1400">
+                <a:latin typeface="Roboto" panose="02000000000000000000" pitchFamily="2" charset="0"/>
+                <a:ea typeface="Roboto" panose="02000000000000000000" pitchFamily="2" charset="0"/>
+              </a:rPr>
+              <a:t>5.2. During normal routing, we just render. But this error handling, we</a:t>
+            </a:r>
+          </a:p>
+          <a:p>
+            <a:r>
+              <a:rPr lang="en-IN" sz="1400">
+                <a:latin typeface="Roboto" panose="02000000000000000000" pitchFamily="2" charset="0"/>
+                <a:ea typeface="Roboto" panose="02000000000000000000" pitchFamily="2" charset="0"/>
+              </a:rPr>
+              <a:t>Need to inform client, the http status (which otherwise receive 200 for normal). So we set the status and send as follows</a:t>
+            </a:r>
+          </a:p>
+          <a:p>
+            <a:endParaRPr lang="en-IN" sz="1400">
+              <a:latin typeface="Roboto" panose="02000000000000000000" pitchFamily="2" charset="0"/>
+              <a:ea typeface="Roboto" panose="02000000000000000000" pitchFamily="2" charset="0"/>
+            </a:endParaRPr>
+          </a:p>
+          <a:p>
+            <a:r>
+              <a:rPr lang="en-IN" sz="1400">
+                <a:solidFill>
+                  <a:srgbClr val="3333CC"/>
+                </a:solidFill>
+                <a:latin typeface="Roboto" panose="02000000000000000000" pitchFamily="2" charset="0"/>
+                <a:ea typeface="Roboto" panose="02000000000000000000" pitchFamily="2" charset="0"/>
+              </a:rPr>
+              <a:t>Response.status(404).render(“404”); in app.js</a:t>
+            </a:r>
+          </a:p>
+          <a:p>
+            <a:endParaRPr lang="en-IN" sz="1400">
+              <a:solidFill>
+                <a:srgbClr val="3333CC"/>
+              </a:solidFill>
+              <a:latin typeface="Roboto" panose="02000000000000000000" pitchFamily="2" charset="0"/>
+              <a:ea typeface="Roboto" panose="02000000000000000000" pitchFamily="2" charset="0"/>
+            </a:endParaRPr>
+          </a:p>
+          <a:p>
+            <a:r>
+              <a:rPr lang="en-IN" sz="1400">
+                <a:solidFill>
+                  <a:srgbClr val="3333CC"/>
+                </a:solidFill>
+                <a:latin typeface="Roboto" panose="02000000000000000000" pitchFamily="2" charset="0"/>
+                <a:ea typeface="Roboto" panose="02000000000000000000" pitchFamily="2" charset="0"/>
+              </a:rPr>
+              <a:t>Response.status(500).render(“500”) in app.js &amp; error location</a:t>
+            </a:r>
+          </a:p>
+          <a:p>
+            <a:endParaRPr lang="en-IN" sz="1400">
+              <a:latin typeface="Roboto" panose="02000000000000000000" pitchFamily="2" charset="0"/>
+              <a:ea typeface="Roboto" panose="02000000000000000000" pitchFamily="2" charset="0"/>
+            </a:endParaRPr>
+          </a:p>
+          <a:p>
+            <a:r>
+              <a:rPr lang="en-IN" sz="1400">
+                <a:latin typeface="Roboto" panose="02000000000000000000" pitchFamily="2" charset="0"/>
+                <a:ea typeface="Roboto" panose="02000000000000000000" pitchFamily="2" charset="0"/>
+              </a:rPr>
+              <a:t>5.3. These routing in app.js should be placed as last of all routing. </a:t>
+            </a:r>
+          </a:p>
+          <a:p>
+            <a:endParaRPr lang="en-IN" sz="1400">
+              <a:latin typeface="Roboto" panose="02000000000000000000" pitchFamily="2" charset="0"/>
+              <a:ea typeface="Roboto" panose="02000000000000000000" pitchFamily="2" charset="0"/>
+            </a:endParaRPr>
+          </a:p>
+          <a:p>
+            <a:r>
+              <a:rPr lang="en-IN" sz="1400">
+                <a:latin typeface="Roboto" panose="02000000000000000000" pitchFamily="2" charset="0"/>
+                <a:ea typeface="Roboto" panose="02000000000000000000" pitchFamily="2" charset="0"/>
+              </a:rPr>
+              <a:t>5.4. For now for demo, </a:t>
+            </a:r>
+          </a:p>
+          <a:p>
+            <a:r>
+              <a:rPr lang="en-IN" sz="1400">
+                <a:latin typeface="Roboto" panose="02000000000000000000" pitchFamily="2" charset="0"/>
+                <a:ea typeface="Roboto" panose="02000000000000000000" pitchFamily="2" charset="0"/>
+              </a:rPr>
+              <a:t>	DB error for saving story : 500</a:t>
+            </a:r>
+          </a:p>
+          <a:p>
+            <a:r>
+              <a:rPr lang="en-IN" sz="1400">
+                <a:latin typeface="Roboto" panose="02000000000000000000" pitchFamily="2" charset="0"/>
+                <a:ea typeface="Roboto" panose="02000000000000000000" pitchFamily="2" charset="0"/>
+              </a:rPr>
+              <a:t>	DB connection: chalk</a:t>
+            </a:r>
+          </a:p>
+        </p:txBody>
+      </p:sp>
+      <p:pic>
+        <p:nvPicPr>
+          <p:cNvPr id="14" name="Picture 13">
+            <a:extLst>
+              <a:ext uri="{FF2B5EF4-FFF2-40B4-BE49-F238E27FC236}">
+                <a16:creationId xmlns:a16="http://schemas.microsoft.com/office/drawing/2014/main" id="{58D044C8-F58D-42E2-801C-1DE0B45B2406}"/>
+              </a:ext>
+            </a:extLst>
+          </p:cNvPr>
+          <p:cNvPicPr>
+            <a:picLocks noChangeAspect="1"/>
+          </p:cNvPicPr>
+          <p:nvPr/>
+        </p:nvPicPr>
+        <p:blipFill>
+          <a:blip r:embed="rId2">
+            <a:extLst>
+              <a:ext uri="{28A0092B-C50C-407E-A947-70E740481C1C}">
+                <a14:useLocalDpi xmlns:a14="http://schemas.microsoft.com/office/drawing/2010/main" val="0"/>
+              </a:ext>
+            </a:extLst>
+          </a:blip>
+          <a:stretch>
+            <a:fillRect/>
+          </a:stretch>
+        </p:blipFill>
+        <p:spPr>
+          <a:xfrm>
+            <a:off x="6235666" y="1184919"/>
+            <a:ext cx="3130006" cy="2880934"/>
+          </a:xfrm>
+          <a:prstGeom prst="rect">
+            <a:avLst/>
+          </a:prstGeom>
+        </p:spPr>
+      </p:pic>
+      <p:sp>
+        <p:nvSpPr>
+          <p:cNvPr id="16" name="TextBox 15">
+            <a:extLst>
+              <a:ext uri="{FF2B5EF4-FFF2-40B4-BE49-F238E27FC236}">
+                <a16:creationId xmlns:a16="http://schemas.microsoft.com/office/drawing/2014/main" id="{BD2573AA-6DBB-40C3-925D-1F699F35C8D0}"/>
+              </a:ext>
+            </a:extLst>
+          </p:cNvPr>
+          <p:cNvSpPr txBox="1"/>
+          <p:nvPr/>
+        </p:nvSpPr>
+        <p:spPr>
+          <a:xfrm>
+            <a:off x="6169891" y="864658"/>
+            <a:ext cx="766557" cy="338554"/>
+          </a:xfrm>
+          <a:prstGeom prst="rect">
+            <a:avLst/>
+          </a:prstGeom>
+          <a:noFill/>
+        </p:spPr>
+        <p:txBody>
+          <a:bodyPr wrap="none" rtlCol="0">
+            <a:spAutoFit/>
+          </a:bodyPr>
+          <a:lstStyle/>
+          <a:p>
+            <a:r>
+              <a:rPr lang="en-IN" sz="1600">
+                <a:latin typeface="Roboto" panose="02000000000000000000" pitchFamily="2" charset="0"/>
+                <a:ea typeface="Roboto" panose="02000000000000000000" pitchFamily="2" charset="0"/>
+              </a:rPr>
+              <a:t>App.js</a:t>
+            </a:r>
+          </a:p>
+        </p:txBody>
+      </p:sp>
+      <p:sp>
+        <p:nvSpPr>
+          <p:cNvPr id="18" name="TextBox 17">
+            <a:extLst>
+              <a:ext uri="{FF2B5EF4-FFF2-40B4-BE49-F238E27FC236}">
+                <a16:creationId xmlns:a16="http://schemas.microsoft.com/office/drawing/2014/main" id="{3D4724AB-F100-48D2-BECB-3296465AF5B0}"/>
+              </a:ext>
+            </a:extLst>
+          </p:cNvPr>
+          <p:cNvSpPr txBox="1"/>
+          <p:nvPr/>
+        </p:nvSpPr>
+        <p:spPr>
+          <a:xfrm>
+            <a:off x="10015268" y="846365"/>
+            <a:ext cx="949299" cy="338554"/>
+          </a:xfrm>
+          <a:prstGeom prst="rect">
+            <a:avLst/>
+          </a:prstGeom>
+          <a:noFill/>
+        </p:spPr>
+        <p:txBody>
+          <a:bodyPr wrap="none" rtlCol="0">
+            <a:spAutoFit/>
+          </a:bodyPr>
+          <a:lstStyle/>
+          <a:p>
+            <a:r>
+              <a:rPr lang="en-IN" sz="1600">
+                <a:latin typeface="Roboto" panose="02000000000000000000" pitchFamily="2" charset="0"/>
+                <a:ea typeface="Roboto" panose="02000000000000000000" pitchFamily="2" charset="0"/>
+              </a:rPr>
+              <a:t>Route.js</a:t>
+            </a:r>
+          </a:p>
+        </p:txBody>
+      </p:sp>
+      <p:pic>
+        <p:nvPicPr>
+          <p:cNvPr id="20" name="Picture 19">
+            <a:extLst>
+              <a:ext uri="{FF2B5EF4-FFF2-40B4-BE49-F238E27FC236}">
+                <a16:creationId xmlns:a16="http://schemas.microsoft.com/office/drawing/2014/main" id="{1EA194B2-01EA-4BDC-AF18-BA11ABF953AF}"/>
+              </a:ext>
+            </a:extLst>
+          </p:cNvPr>
+          <p:cNvPicPr>
+            <a:picLocks noChangeAspect="1"/>
+          </p:cNvPicPr>
+          <p:nvPr/>
+        </p:nvPicPr>
+        <p:blipFill rotWithShape="1">
+          <a:blip r:embed="rId3">
+            <a:extLst>
+              <a:ext uri="{28A0092B-C50C-407E-A947-70E740481C1C}">
+                <a14:useLocalDpi xmlns:a14="http://schemas.microsoft.com/office/drawing/2010/main" val="0"/>
+              </a:ext>
+            </a:extLst>
+          </a:blip>
+          <a:srcRect r="40062"/>
+          <a:stretch/>
+        </p:blipFill>
+        <p:spPr>
+          <a:xfrm>
+            <a:off x="10015268" y="1203212"/>
+            <a:ext cx="3910798" cy="2862641"/>
+          </a:xfrm>
+          <a:prstGeom prst="rect">
+            <a:avLst/>
+          </a:prstGeom>
+        </p:spPr>
+      </p:pic>
+      <p:sp>
+        <p:nvSpPr>
+          <p:cNvPr id="21" name="Rectangle 20">
+            <a:extLst>
+              <a:ext uri="{FF2B5EF4-FFF2-40B4-BE49-F238E27FC236}">
+                <a16:creationId xmlns:a16="http://schemas.microsoft.com/office/drawing/2014/main" id="{9A338132-A494-4A48-909B-3D7F2C3A9C3C}"/>
+              </a:ext>
+            </a:extLst>
+          </p:cNvPr>
+          <p:cNvSpPr/>
+          <p:nvPr/>
+        </p:nvSpPr>
+        <p:spPr>
+          <a:xfrm>
+            <a:off x="10854058" y="2442407"/>
+            <a:ext cx="1439542" cy="328501"/>
+          </a:xfrm>
+          <a:prstGeom prst="rect">
+            <a:avLst/>
+          </a:prstGeom>
+          <a:solidFill>
+            <a:srgbClr val="FFFF00">
+              <a:alpha val="25000"/>
+            </a:srgbClr>
+          </a:solidFill>
+          <a:ln>
+            <a:noFill/>
+          </a:ln>
+        </p:spPr>
+        <p:style>
+          <a:lnRef idx="2">
+            <a:schemeClr val="accent1">
+              <a:shade val="50000"/>
+            </a:schemeClr>
+          </a:lnRef>
+          <a:fillRef idx="1">
+            <a:schemeClr val="accent1"/>
+          </a:fillRef>
+          <a:effectRef idx="0">
+            <a:schemeClr val="accent1"/>
+          </a:effectRef>
+          <a:fontRef idx="minor">
+            <a:schemeClr val="lt1"/>
+          </a:fontRef>
+        </p:style>
+        <p:txBody>
+          <a:bodyPr rtlCol="0" anchor="ctr"/>
+          <a:lstStyle/>
+          <a:p>
+            <a:pPr algn="ctr"/>
+            <a:endParaRPr lang="en-IN"/>
+          </a:p>
+        </p:txBody>
+      </p:sp>
+      <p:sp>
+        <p:nvSpPr>
+          <p:cNvPr id="22" name="Rectangle 21">
+            <a:extLst>
+              <a:ext uri="{FF2B5EF4-FFF2-40B4-BE49-F238E27FC236}">
+                <a16:creationId xmlns:a16="http://schemas.microsoft.com/office/drawing/2014/main" id="{E11A342A-E06C-4FFF-8711-CC19EF828EB6}"/>
+              </a:ext>
+            </a:extLst>
+          </p:cNvPr>
+          <p:cNvSpPr/>
+          <p:nvPr/>
+        </p:nvSpPr>
+        <p:spPr>
+          <a:xfrm>
+            <a:off x="6757731" y="3342953"/>
+            <a:ext cx="1536524" cy="370065"/>
+          </a:xfrm>
+          <a:prstGeom prst="rect">
+            <a:avLst/>
+          </a:prstGeom>
+          <a:solidFill>
+            <a:srgbClr val="FFFF00">
+              <a:alpha val="25000"/>
+            </a:srgbClr>
+          </a:solidFill>
+          <a:ln>
+            <a:noFill/>
+          </a:ln>
+        </p:spPr>
+        <p:style>
+          <a:lnRef idx="2">
+            <a:schemeClr val="accent1">
+              <a:shade val="50000"/>
+            </a:schemeClr>
+          </a:lnRef>
+          <a:fillRef idx="1">
+            <a:schemeClr val="accent1"/>
+          </a:fillRef>
+          <a:effectRef idx="0">
+            <a:schemeClr val="accent1"/>
+          </a:effectRef>
+          <a:fontRef idx="minor">
+            <a:schemeClr val="lt1"/>
+          </a:fontRef>
+        </p:style>
+        <p:txBody>
+          <a:bodyPr rtlCol="0" anchor="ctr"/>
+          <a:lstStyle/>
+          <a:p>
+            <a:pPr algn="ctr"/>
+            <a:endParaRPr lang="en-IN"/>
+          </a:p>
+        </p:txBody>
+      </p:sp>
+      <p:sp>
+        <p:nvSpPr>
+          <p:cNvPr id="23" name="Rectangle 22">
+            <a:extLst>
+              <a:ext uri="{FF2B5EF4-FFF2-40B4-BE49-F238E27FC236}">
+                <a16:creationId xmlns:a16="http://schemas.microsoft.com/office/drawing/2014/main" id="{925F8846-4685-4AC0-AB6D-2C81DF963165}"/>
+              </a:ext>
+            </a:extLst>
+          </p:cNvPr>
+          <p:cNvSpPr/>
+          <p:nvPr/>
+        </p:nvSpPr>
+        <p:spPr>
+          <a:xfrm>
+            <a:off x="6757731" y="2072342"/>
+            <a:ext cx="1536524" cy="370065"/>
+          </a:xfrm>
+          <a:prstGeom prst="rect">
+            <a:avLst/>
+          </a:prstGeom>
+          <a:solidFill>
+            <a:srgbClr val="FFFF00">
+              <a:alpha val="25000"/>
+            </a:srgbClr>
+          </a:solidFill>
+          <a:ln>
+            <a:noFill/>
+          </a:ln>
+        </p:spPr>
+        <p:style>
+          <a:lnRef idx="2">
+            <a:schemeClr val="accent1">
+              <a:shade val="50000"/>
+            </a:schemeClr>
+          </a:lnRef>
+          <a:fillRef idx="1">
+            <a:schemeClr val="accent1"/>
+          </a:fillRef>
+          <a:effectRef idx="0">
+            <a:schemeClr val="accent1"/>
+          </a:effectRef>
+          <a:fontRef idx="minor">
+            <a:schemeClr val="lt1"/>
+          </a:fontRef>
+        </p:style>
+        <p:txBody>
+          <a:bodyPr rtlCol="0" anchor="ctr"/>
+          <a:lstStyle/>
+          <a:p>
+            <a:pPr algn="ctr"/>
+            <a:endParaRPr lang="en-IN"/>
+          </a:p>
+        </p:txBody>
+      </p:sp>
+      <p:sp>
+        <p:nvSpPr>
+          <p:cNvPr id="24" name="TextBox 23">
+            <a:extLst>
+              <a:ext uri="{FF2B5EF4-FFF2-40B4-BE49-F238E27FC236}">
+                <a16:creationId xmlns:a16="http://schemas.microsoft.com/office/drawing/2014/main" id="{D004FC7B-09D6-45F8-83C7-65510F46DFFD}"/>
+              </a:ext>
+            </a:extLst>
+          </p:cNvPr>
+          <p:cNvSpPr txBox="1"/>
+          <p:nvPr/>
+        </p:nvSpPr>
+        <p:spPr>
+          <a:xfrm>
+            <a:off x="10125450" y="4232844"/>
+            <a:ext cx="3690434" cy="738664"/>
+          </a:xfrm>
+          <a:prstGeom prst="rect">
+            <a:avLst/>
+          </a:prstGeom>
+          <a:noFill/>
+        </p:spPr>
+        <p:txBody>
+          <a:bodyPr wrap="none" rtlCol="0">
+            <a:spAutoFit/>
+          </a:bodyPr>
+          <a:lstStyle/>
+          <a:p>
+            <a:r>
+              <a:rPr lang="en-IN" sz="1400" b="1">
+                <a:latin typeface="Roboto" panose="02000000000000000000" pitchFamily="2" charset="0"/>
+                <a:ea typeface="Roboto" panose="02000000000000000000" pitchFamily="2" charset="0"/>
+              </a:rPr>
+              <a:t>Note</a:t>
+            </a:r>
+            <a:r>
+              <a:rPr lang="en-IN" sz="1400">
+                <a:latin typeface="Roboto" panose="02000000000000000000" pitchFamily="2" charset="0"/>
+                <a:ea typeface="Roboto" panose="02000000000000000000" pitchFamily="2" charset="0"/>
+              </a:rPr>
+              <a:t>: As per tutorial we have to send(500)</a:t>
+            </a:r>
+          </a:p>
+          <a:p>
+            <a:r>
+              <a:rPr lang="en-IN" sz="1400">
+                <a:latin typeface="Roboto" panose="02000000000000000000" pitchFamily="2" charset="0"/>
+                <a:ea typeface="Roboto" panose="02000000000000000000" pitchFamily="2" charset="0"/>
+              </a:rPr>
+              <a:t>Instead of render() as above  which atm</a:t>
+            </a:r>
+          </a:p>
+          <a:p>
+            <a:r>
+              <a:rPr lang="en-IN" sz="1400">
+                <a:latin typeface="Roboto" panose="02000000000000000000" pitchFamily="2" charset="0"/>
+                <a:ea typeface="Roboto" panose="02000000000000000000" pitchFamily="2" charset="0"/>
+              </a:rPr>
+              <a:t>Raised as a query. Awaiting edureka’s reply</a:t>
+            </a:r>
+          </a:p>
+        </p:txBody>
+      </p:sp>
+    </p:spTree>
+    <p:extLst>
+      <p:ext uri="{BB962C8B-B14F-4D97-AF65-F5344CB8AC3E}">
+        <p14:creationId xmlns:p14="http://schemas.microsoft.com/office/powerpoint/2010/main" val="1906766288"/>
+      </p:ext>
+    </p:extLst>
+  </p:cSld>
+  <p:clrMapOvr>
+    <a:masterClrMapping/>
+  </p:clrMapOvr>
+</p:sld>
+</file>
+
+<file path=ppt/slides/slide32.xml><?xml version="1.0" encoding="utf-8"?>
+<p:sld xmlns:a="http://schemas.openxmlformats.org/drawingml/2006/main" xmlns:r="http://schemas.openxmlformats.org/officeDocument/2006/relationships" xmlns:p="http://schemas.openxmlformats.org/presentationml/2006/main">
+  <p:cSld>
+    <p:spTree>
+      <p:nvGrpSpPr>
+        <p:cNvPr id="1" name=""/>
+        <p:cNvGrpSpPr/>
+        <p:nvPr/>
+      </p:nvGrpSpPr>
+      <p:grpSpPr>
+        <a:xfrm>
+          <a:off x="0" y="0"/>
+          <a:ext cx="0" cy="0"/>
+          <a:chOff x="0" y="0"/>
+          <a:chExt cx="0" cy="0"/>
+        </a:xfrm>
+      </p:grpSpPr>
+      <p:sp>
+        <p:nvSpPr>
+          <p:cNvPr id="10" name="TextBox 9">
+            <a:extLst>
+              <a:ext uri="{FF2B5EF4-FFF2-40B4-BE49-F238E27FC236}">
+                <a16:creationId xmlns:a16="http://schemas.microsoft.com/office/drawing/2014/main" id="{06D9F812-F890-407A-8D26-9948CB987CF8}"/>
+              </a:ext>
+            </a:extLst>
+          </p:cNvPr>
+          <p:cNvSpPr txBox="1"/>
+          <p:nvPr/>
+        </p:nvSpPr>
+        <p:spPr>
+          <a:xfrm>
+            <a:off x="155809" y="30475"/>
+            <a:ext cx="1517812" cy="523220"/>
+          </a:xfrm>
+          <a:prstGeom prst="rect">
+            <a:avLst/>
+          </a:prstGeom>
+          <a:solidFill>
+            <a:srgbClr val="FFFF00"/>
+          </a:solidFill>
+        </p:spPr>
+        <p:txBody>
+          <a:bodyPr wrap="square" rtlCol="0">
+            <a:spAutoFit/>
+          </a:bodyPr>
+          <a:lstStyle/>
+          <a:p>
+            <a:r>
+              <a:rPr lang="en-IN" sz="2800" u="sng">
+                <a:latin typeface="Roboto" panose="02000000000000000000" pitchFamily="2" charset="0"/>
+                <a:ea typeface="Roboto" panose="02000000000000000000" pitchFamily="2" charset="0"/>
+              </a:rPr>
+              <a:t>Phase 5</a:t>
+            </a:r>
+          </a:p>
+        </p:txBody>
+      </p:sp>
+      <p:pic>
+        <p:nvPicPr>
+          <p:cNvPr id="3" name="Picture 2">
+            <a:extLst>
+              <a:ext uri="{FF2B5EF4-FFF2-40B4-BE49-F238E27FC236}">
+                <a16:creationId xmlns:a16="http://schemas.microsoft.com/office/drawing/2014/main" id="{A6C5ECE8-ACBC-4B77-A9BA-6B958B011A1A}"/>
+              </a:ext>
+            </a:extLst>
+          </p:cNvPr>
+          <p:cNvPicPr>
+            <a:picLocks noChangeAspect="1"/>
+          </p:cNvPicPr>
+          <p:nvPr/>
+        </p:nvPicPr>
+        <p:blipFill>
+          <a:blip r:embed="rId2">
+            <a:extLst>
+              <a:ext uri="{28A0092B-C50C-407E-A947-70E740481C1C}">
+                <a14:useLocalDpi xmlns:a14="http://schemas.microsoft.com/office/drawing/2010/main" val="0"/>
+              </a:ext>
+            </a:extLst>
+          </a:blip>
+          <a:stretch>
+            <a:fillRect/>
+          </a:stretch>
+        </p:blipFill>
+        <p:spPr>
+          <a:xfrm>
+            <a:off x="295563" y="1080940"/>
+            <a:ext cx="5477164" cy="5523806"/>
+          </a:xfrm>
+          <a:prstGeom prst="rect">
+            <a:avLst/>
+          </a:prstGeom>
+        </p:spPr>
+      </p:pic>
+      <p:sp>
+        <p:nvSpPr>
+          <p:cNvPr id="15" name="TextBox 14">
+            <a:extLst>
+              <a:ext uri="{FF2B5EF4-FFF2-40B4-BE49-F238E27FC236}">
+                <a16:creationId xmlns:a16="http://schemas.microsoft.com/office/drawing/2014/main" id="{949A3751-456C-42BD-A6DA-A79ADE04C8B6}"/>
+              </a:ext>
+            </a:extLst>
+          </p:cNvPr>
+          <p:cNvSpPr txBox="1"/>
+          <p:nvPr/>
+        </p:nvSpPr>
+        <p:spPr>
+          <a:xfrm>
+            <a:off x="295563" y="742386"/>
+            <a:ext cx="3259226" cy="338554"/>
+          </a:xfrm>
+          <a:prstGeom prst="rect">
+            <a:avLst/>
+          </a:prstGeom>
+          <a:noFill/>
+        </p:spPr>
+        <p:txBody>
+          <a:bodyPr wrap="none" rtlCol="0">
+            <a:spAutoFit/>
+          </a:bodyPr>
+          <a:lstStyle/>
+          <a:p>
+            <a:r>
+              <a:rPr lang="en-IN" sz="1600">
+                <a:latin typeface="Roboto" panose="02000000000000000000" pitchFamily="2" charset="0"/>
+                <a:ea typeface="Roboto" panose="02000000000000000000" pitchFamily="2" charset="0"/>
+              </a:rPr>
+              <a:t>404.Ejs (and similarly for 500.ejs)</a:t>
+            </a:r>
+          </a:p>
+        </p:txBody>
+      </p:sp>
+      <p:pic>
+        <p:nvPicPr>
+          <p:cNvPr id="5" name="Picture 4">
+            <a:extLst>
+              <a:ext uri="{FF2B5EF4-FFF2-40B4-BE49-F238E27FC236}">
+                <a16:creationId xmlns:a16="http://schemas.microsoft.com/office/drawing/2014/main" id="{79453244-9D6F-47D2-885D-0630F313869A}"/>
+              </a:ext>
+            </a:extLst>
+          </p:cNvPr>
+          <p:cNvPicPr>
+            <a:picLocks noChangeAspect="1"/>
+          </p:cNvPicPr>
+          <p:nvPr/>
+        </p:nvPicPr>
+        <p:blipFill>
+          <a:blip r:embed="rId3">
+            <a:extLst>
+              <a:ext uri="{28A0092B-C50C-407E-A947-70E740481C1C}">
+                <a14:useLocalDpi xmlns:a14="http://schemas.microsoft.com/office/drawing/2010/main" val="0"/>
+              </a:ext>
+            </a:extLst>
+          </a:blip>
+          <a:stretch>
+            <a:fillRect/>
+          </a:stretch>
+        </p:blipFill>
+        <p:spPr>
+          <a:xfrm>
+            <a:off x="7808867" y="553695"/>
+            <a:ext cx="3782769" cy="4067560"/>
+          </a:xfrm>
+          <a:prstGeom prst="rect">
+            <a:avLst/>
+          </a:prstGeom>
+        </p:spPr>
+      </p:pic>
+      <p:sp>
+        <p:nvSpPr>
+          <p:cNvPr id="17" name="TextBox 16">
+            <a:extLst>
+              <a:ext uri="{FF2B5EF4-FFF2-40B4-BE49-F238E27FC236}">
+                <a16:creationId xmlns:a16="http://schemas.microsoft.com/office/drawing/2014/main" id="{7D52D9B6-CCD7-4CA6-AED2-16DF750433BB}"/>
+              </a:ext>
+            </a:extLst>
+          </p:cNvPr>
+          <p:cNvSpPr txBox="1"/>
+          <p:nvPr/>
+        </p:nvSpPr>
+        <p:spPr>
+          <a:xfrm>
+            <a:off x="7624618" y="215141"/>
+            <a:ext cx="4161717" cy="338554"/>
+          </a:xfrm>
+          <a:prstGeom prst="rect">
+            <a:avLst/>
+          </a:prstGeom>
+          <a:noFill/>
+        </p:spPr>
+        <p:txBody>
+          <a:bodyPr wrap="none" rtlCol="0">
+            <a:spAutoFit/>
+          </a:bodyPr>
+          <a:lstStyle/>
+          <a:p>
+            <a:r>
+              <a:rPr lang="en-IN" sz="1600">
+                <a:latin typeface="Roboto" panose="02000000000000000000" pitchFamily="2" charset="0"/>
+                <a:ea typeface="Roboto" panose="02000000000000000000" pitchFamily="2" charset="0"/>
+              </a:rPr>
+              <a:t>Using chalk in db.js (very straight forward)</a:t>
+            </a:r>
+          </a:p>
+        </p:txBody>
+      </p:sp>
+      <p:sp>
+        <p:nvSpPr>
+          <p:cNvPr id="19" name="Rectangle 18">
+            <a:extLst>
+              <a:ext uri="{FF2B5EF4-FFF2-40B4-BE49-F238E27FC236}">
+                <a16:creationId xmlns:a16="http://schemas.microsoft.com/office/drawing/2014/main" id="{F15B1B56-71D8-4CA9-B790-2BAEAF776AA7}"/>
+              </a:ext>
+            </a:extLst>
+          </p:cNvPr>
+          <p:cNvSpPr/>
+          <p:nvPr/>
+        </p:nvSpPr>
+        <p:spPr>
+          <a:xfrm>
+            <a:off x="7808867" y="727998"/>
+            <a:ext cx="1439542" cy="164251"/>
+          </a:xfrm>
+          <a:prstGeom prst="rect">
+            <a:avLst/>
+          </a:prstGeom>
+          <a:solidFill>
+            <a:srgbClr val="FFFF00">
+              <a:alpha val="25000"/>
+            </a:srgbClr>
+          </a:solidFill>
+          <a:ln>
+            <a:noFill/>
+          </a:ln>
+        </p:spPr>
+        <p:style>
+          <a:lnRef idx="2">
+            <a:schemeClr val="accent1">
+              <a:shade val="50000"/>
+            </a:schemeClr>
+          </a:lnRef>
+          <a:fillRef idx="1">
+            <a:schemeClr val="accent1"/>
+          </a:fillRef>
+          <a:effectRef idx="0">
+            <a:schemeClr val="accent1"/>
+          </a:effectRef>
+          <a:fontRef idx="minor">
+            <a:schemeClr val="lt1"/>
+          </a:fontRef>
+        </p:style>
+        <p:txBody>
+          <a:bodyPr rtlCol="0" anchor="ctr"/>
+          <a:lstStyle/>
+          <a:p>
+            <a:pPr algn="ctr"/>
+            <a:endParaRPr lang="en-IN"/>
+          </a:p>
+        </p:txBody>
+      </p:sp>
+      <p:sp>
+        <p:nvSpPr>
+          <p:cNvPr id="25" name="Rectangle 24">
+            <a:extLst>
+              <a:ext uri="{FF2B5EF4-FFF2-40B4-BE49-F238E27FC236}">
+                <a16:creationId xmlns:a16="http://schemas.microsoft.com/office/drawing/2014/main" id="{F798FF56-F0AB-4E2A-B92E-84D042164B1E}"/>
+              </a:ext>
+            </a:extLst>
+          </p:cNvPr>
+          <p:cNvSpPr/>
+          <p:nvPr/>
+        </p:nvSpPr>
+        <p:spPr>
+          <a:xfrm>
+            <a:off x="8783783" y="2438018"/>
+            <a:ext cx="665018" cy="185109"/>
+          </a:xfrm>
+          <a:prstGeom prst="rect">
+            <a:avLst/>
+          </a:prstGeom>
+          <a:solidFill>
+            <a:srgbClr val="FFFF00">
+              <a:alpha val="25000"/>
+            </a:srgbClr>
+          </a:solidFill>
+          <a:ln>
+            <a:noFill/>
+          </a:ln>
+        </p:spPr>
+        <p:style>
+          <a:lnRef idx="2">
+            <a:schemeClr val="accent1">
+              <a:shade val="50000"/>
+            </a:schemeClr>
+          </a:lnRef>
+          <a:fillRef idx="1">
+            <a:schemeClr val="accent1"/>
+          </a:fillRef>
+          <a:effectRef idx="0">
+            <a:schemeClr val="accent1"/>
+          </a:effectRef>
+          <a:fontRef idx="minor">
+            <a:schemeClr val="lt1"/>
+          </a:fontRef>
+        </p:style>
+        <p:txBody>
+          <a:bodyPr rtlCol="0" anchor="ctr"/>
+          <a:lstStyle/>
+          <a:p>
+            <a:pPr algn="ctr"/>
+            <a:endParaRPr lang="en-IN"/>
+          </a:p>
+        </p:txBody>
+      </p:sp>
+      <p:sp>
+        <p:nvSpPr>
+          <p:cNvPr id="26" name="Rectangle 25">
+            <a:extLst>
+              <a:ext uri="{FF2B5EF4-FFF2-40B4-BE49-F238E27FC236}">
+                <a16:creationId xmlns:a16="http://schemas.microsoft.com/office/drawing/2014/main" id="{267D5DC7-C196-4B41-BE15-723855E87F6C}"/>
+              </a:ext>
+            </a:extLst>
+          </p:cNvPr>
+          <p:cNvSpPr/>
+          <p:nvPr/>
+        </p:nvSpPr>
+        <p:spPr>
+          <a:xfrm>
+            <a:off x="8686801" y="3209254"/>
+            <a:ext cx="665018" cy="185109"/>
+          </a:xfrm>
+          <a:prstGeom prst="rect">
+            <a:avLst/>
+          </a:prstGeom>
+          <a:solidFill>
+            <a:srgbClr val="FFFF00">
+              <a:alpha val="25000"/>
+            </a:srgbClr>
+          </a:solidFill>
+          <a:ln>
+            <a:noFill/>
+          </a:ln>
+        </p:spPr>
+        <p:style>
+          <a:lnRef idx="2">
+            <a:schemeClr val="accent1">
+              <a:shade val="50000"/>
+            </a:schemeClr>
+          </a:lnRef>
+          <a:fillRef idx="1">
+            <a:schemeClr val="accent1"/>
+          </a:fillRef>
+          <a:effectRef idx="0">
+            <a:schemeClr val="accent1"/>
+          </a:effectRef>
+          <a:fontRef idx="minor">
+            <a:schemeClr val="lt1"/>
+          </a:fontRef>
+        </p:style>
+        <p:txBody>
+          <a:bodyPr rtlCol="0" anchor="ctr"/>
+          <a:lstStyle/>
+          <a:p>
+            <a:pPr algn="ctr"/>
+            <a:endParaRPr lang="en-IN"/>
+          </a:p>
+        </p:txBody>
+      </p:sp>
+      <p:sp>
+        <p:nvSpPr>
+          <p:cNvPr id="27" name="Rectangle 26">
+            <a:extLst>
+              <a:ext uri="{FF2B5EF4-FFF2-40B4-BE49-F238E27FC236}">
+                <a16:creationId xmlns:a16="http://schemas.microsoft.com/office/drawing/2014/main" id="{036B0D79-F49E-4555-8F05-70BB24401860}"/>
+              </a:ext>
+            </a:extLst>
+          </p:cNvPr>
+          <p:cNvSpPr/>
+          <p:nvPr/>
+        </p:nvSpPr>
+        <p:spPr>
+          <a:xfrm>
+            <a:off x="8686801" y="4076341"/>
+            <a:ext cx="665018" cy="185109"/>
+          </a:xfrm>
+          <a:prstGeom prst="rect">
+            <a:avLst/>
+          </a:prstGeom>
+          <a:solidFill>
+            <a:srgbClr val="FFFF00">
+              <a:alpha val="25000"/>
+            </a:srgbClr>
+          </a:solidFill>
+          <a:ln>
+            <a:noFill/>
+          </a:ln>
+        </p:spPr>
+        <p:style>
+          <a:lnRef idx="2">
+            <a:schemeClr val="accent1">
+              <a:shade val="50000"/>
+            </a:schemeClr>
+          </a:lnRef>
+          <a:fillRef idx="1">
+            <a:schemeClr val="accent1"/>
+          </a:fillRef>
+          <a:effectRef idx="0">
+            <a:schemeClr val="accent1"/>
+          </a:effectRef>
+          <a:fontRef idx="minor">
+            <a:schemeClr val="lt1"/>
+          </a:fontRef>
+        </p:style>
+        <p:txBody>
+          <a:bodyPr rtlCol="0" anchor="ctr"/>
+          <a:lstStyle/>
+          <a:p>
+            <a:pPr algn="ctr"/>
+            <a:endParaRPr lang="en-IN"/>
+          </a:p>
+        </p:txBody>
+      </p:sp>
+      <p:pic>
+        <p:nvPicPr>
+          <p:cNvPr id="8" name="Picture 7">
+            <a:extLst>
+              <a:ext uri="{FF2B5EF4-FFF2-40B4-BE49-F238E27FC236}">
+                <a16:creationId xmlns:a16="http://schemas.microsoft.com/office/drawing/2014/main" id="{8B3F1475-5DB0-4D61-89DB-0FF5DB494A6B}"/>
+              </a:ext>
+            </a:extLst>
+          </p:cNvPr>
+          <p:cNvPicPr>
+            <a:picLocks noChangeAspect="1"/>
+          </p:cNvPicPr>
+          <p:nvPr/>
+        </p:nvPicPr>
+        <p:blipFill rotWithShape="1">
+          <a:blip r:embed="rId4">
+            <a:extLst>
+              <a:ext uri="{28A0092B-C50C-407E-A947-70E740481C1C}">
+                <a14:useLocalDpi xmlns:a14="http://schemas.microsoft.com/office/drawing/2010/main" val="0"/>
+              </a:ext>
+            </a:extLst>
+          </a:blip>
+          <a:srcRect r="50221" b="38869"/>
+          <a:stretch/>
+        </p:blipFill>
+        <p:spPr>
+          <a:xfrm>
+            <a:off x="6705627" y="4729776"/>
+            <a:ext cx="4627366" cy="1963184"/>
+          </a:xfrm>
+          <a:prstGeom prst="rect">
+            <a:avLst/>
+          </a:prstGeom>
+        </p:spPr>
+      </p:pic>
+      <p:sp>
+        <p:nvSpPr>
+          <p:cNvPr id="9" name="Arrow: Bent 8">
+            <a:extLst>
+              <a:ext uri="{FF2B5EF4-FFF2-40B4-BE49-F238E27FC236}">
+                <a16:creationId xmlns:a16="http://schemas.microsoft.com/office/drawing/2014/main" id="{BDC23366-9F09-4858-B14B-31CE9B95FD89}"/>
+              </a:ext>
+            </a:extLst>
+          </p:cNvPr>
+          <p:cNvSpPr/>
+          <p:nvPr/>
+        </p:nvSpPr>
+        <p:spPr>
+          <a:xfrm rot="16200000" flipH="1">
+            <a:off x="7043823" y="3956650"/>
+            <a:ext cx="531091" cy="609600"/>
+          </a:xfrm>
+          <a:prstGeom prst="bentArrow">
+            <a:avLst/>
+          </a:prstGeom>
+        </p:spPr>
+        <p:style>
+          <a:lnRef idx="2">
+            <a:schemeClr val="accent1">
+              <a:shade val="50000"/>
+            </a:schemeClr>
+          </a:lnRef>
+          <a:fillRef idx="1">
+            <a:schemeClr val="accent1"/>
+          </a:fillRef>
+          <a:effectRef idx="0">
+            <a:schemeClr val="accent1"/>
+          </a:effectRef>
+          <a:fontRef idx="minor">
+            <a:schemeClr val="lt1"/>
+          </a:fontRef>
+        </p:style>
+        <p:txBody>
+          <a:bodyPr rtlCol="0" anchor="ctr"/>
+          <a:lstStyle/>
+          <a:p>
+            <a:pPr algn="ctr"/>
+            <a:endParaRPr lang="en-IN">
+              <a:solidFill>
+                <a:schemeClr val="tx1"/>
+              </a:solidFill>
+            </a:endParaRPr>
+          </a:p>
+        </p:txBody>
+      </p:sp>
+    </p:spTree>
+    <p:extLst>
+      <p:ext uri="{BB962C8B-B14F-4D97-AF65-F5344CB8AC3E}">
+        <p14:creationId xmlns:p14="http://schemas.microsoft.com/office/powerpoint/2010/main" val="2444859022"/>
+      </p:ext>
+    </p:extLst>
+  </p:cSld>
+  <p:clrMapOvr>
+    <a:masterClrMapping/>
+  </p:clrMapOvr>
+</p:sld>
+</file>
+
 <file path=ppt/slides/slide4.xml><?xml version="1.0" encoding="utf-8"?>
 <p:sld xmlns:a="http://schemas.openxmlformats.org/drawingml/2006/main" xmlns:r="http://schemas.openxmlformats.org/officeDocument/2006/relationships" xmlns:p="http://schemas.openxmlformats.org/presentationml/2006/main">
   <p:cSld>

</xml_diff>

<commit_message>
connected to mongodb cloud
</commit_message>
<xml_diff>
--- a/My Understanding.pptx
+++ b/My Understanding.pptx
@@ -5,7 +5,7 @@
     <p:sldMasterId id="2147483660" r:id="rId1"/>
   </p:sldMasterIdLst>
   <p:notesMasterIdLst>
-    <p:notesMasterId r:id="rId34"/>
+    <p:notesMasterId r:id="rId35"/>
   </p:notesMasterIdLst>
   <p:sldIdLst>
     <p:sldId id="259" r:id="rId2"/>
@@ -40,6 +40,7 @@
     <p:sldId id="289" r:id="rId31"/>
     <p:sldId id="290" r:id="rId32"/>
     <p:sldId id="291" r:id="rId33"/>
+    <p:sldId id="292" r:id="rId34"/>
   </p:sldIdLst>
   <p:sldSz cx="14400213" cy="6858000"/>
   <p:notesSz cx="6858000" cy="9144000"/>
@@ -28222,6 +28223,487 @@
 </p:sld>
 </file>
 
+<file path=ppt/slides/slide33.xml><?xml version="1.0" encoding="utf-8"?>
+<p:sld xmlns:a="http://schemas.openxmlformats.org/drawingml/2006/main" xmlns:r="http://schemas.openxmlformats.org/officeDocument/2006/relationships" xmlns:p="http://schemas.openxmlformats.org/presentationml/2006/main">
+  <p:cSld>
+    <p:spTree>
+      <p:nvGrpSpPr>
+        <p:cNvPr id="1" name=""/>
+        <p:cNvGrpSpPr/>
+        <p:nvPr/>
+      </p:nvGrpSpPr>
+      <p:grpSpPr>
+        <a:xfrm>
+          <a:off x="0" y="0"/>
+          <a:ext cx="0" cy="0"/>
+          <a:chOff x="0" y="0"/>
+          <a:chExt cx="0" cy="0"/>
+        </a:xfrm>
+      </p:grpSpPr>
+      <p:sp>
+        <p:nvSpPr>
+          <p:cNvPr id="10" name="TextBox 9">
+            <a:extLst>
+              <a:ext uri="{FF2B5EF4-FFF2-40B4-BE49-F238E27FC236}">
+                <a16:creationId xmlns:a16="http://schemas.microsoft.com/office/drawing/2014/main" id="{06D9F812-F890-407A-8D26-9948CB987CF8}"/>
+              </a:ext>
+            </a:extLst>
+          </p:cNvPr>
+          <p:cNvSpPr txBox="1"/>
+          <p:nvPr/>
+        </p:nvSpPr>
+        <p:spPr>
+          <a:xfrm>
+            <a:off x="155809" y="30475"/>
+            <a:ext cx="1517812" cy="523220"/>
+          </a:xfrm>
+          <a:prstGeom prst="rect">
+            <a:avLst/>
+          </a:prstGeom>
+          <a:solidFill>
+            <a:srgbClr val="FFFF00"/>
+          </a:solidFill>
+        </p:spPr>
+        <p:txBody>
+          <a:bodyPr wrap="square" rtlCol="0">
+            <a:spAutoFit/>
+          </a:bodyPr>
+          <a:lstStyle/>
+          <a:p>
+            <a:r>
+              <a:rPr lang="en-IN" sz="2800" u="sng">
+                <a:latin typeface="Roboto" panose="02000000000000000000" pitchFamily="2" charset="0"/>
+                <a:ea typeface="Roboto" panose="02000000000000000000" pitchFamily="2" charset="0"/>
+              </a:rPr>
+              <a:t>Phase 5</a:t>
+            </a:r>
+          </a:p>
+        </p:txBody>
+      </p:sp>
+      <p:pic>
+        <p:nvPicPr>
+          <p:cNvPr id="5" name="Picture 4">
+            <a:extLst>
+              <a:ext uri="{FF2B5EF4-FFF2-40B4-BE49-F238E27FC236}">
+                <a16:creationId xmlns:a16="http://schemas.microsoft.com/office/drawing/2014/main" id="{79453244-9D6F-47D2-885D-0630F313869A}"/>
+              </a:ext>
+            </a:extLst>
+          </p:cNvPr>
+          <p:cNvPicPr>
+            <a:picLocks noChangeAspect="1"/>
+          </p:cNvPicPr>
+          <p:nvPr/>
+        </p:nvPicPr>
+        <p:blipFill>
+          <a:blip r:embed="rId2">
+            <a:extLst>
+              <a:ext uri="{28A0092B-C50C-407E-A947-70E740481C1C}">
+                <a14:useLocalDpi xmlns:a14="http://schemas.microsoft.com/office/drawing/2010/main" val="0"/>
+              </a:ext>
+            </a:extLst>
+          </a:blip>
+          <a:stretch>
+            <a:fillRect/>
+          </a:stretch>
+        </p:blipFill>
+        <p:spPr>
+          <a:xfrm>
+            <a:off x="7808867" y="553695"/>
+            <a:ext cx="3782769" cy="4067560"/>
+          </a:xfrm>
+          <a:prstGeom prst="rect">
+            <a:avLst/>
+          </a:prstGeom>
+        </p:spPr>
+      </p:pic>
+      <p:sp>
+        <p:nvSpPr>
+          <p:cNvPr id="17" name="TextBox 16">
+            <a:extLst>
+              <a:ext uri="{FF2B5EF4-FFF2-40B4-BE49-F238E27FC236}">
+                <a16:creationId xmlns:a16="http://schemas.microsoft.com/office/drawing/2014/main" id="{7D52D9B6-CCD7-4CA6-AED2-16DF750433BB}"/>
+              </a:ext>
+            </a:extLst>
+          </p:cNvPr>
+          <p:cNvSpPr txBox="1"/>
+          <p:nvPr/>
+        </p:nvSpPr>
+        <p:spPr>
+          <a:xfrm>
+            <a:off x="155809" y="810123"/>
+            <a:ext cx="6191118" cy="1569660"/>
+          </a:xfrm>
+          <a:prstGeom prst="rect">
+            <a:avLst/>
+          </a:prstGeom>
+          <a:noFill/>
+        </p:spPr>
+        <p:txBody>
+          <a:bodyPr wrap="none" rtlCol="0">
+            <a:spAutoFit/>
+          </a:bodyPr>
+          <a:lstStyle/>
+          <a:p>
+            <a:r>
+              <a:rPr lang="en-IN" sz="1600">
+                <a:latin typeface="Roboto" panose="02000000000000000000" pitchFamily="2" charset="0"/>
+                <a:ea typeface="Roboto" panose="02000000000000000000" pitchFamily="2" charset="0"/>
+              </a:rPr>
+              <a:t>Connecting to MongoDB online is so simple and straight forward:</a:t>
+            </a:r>
+          </a:p>
+          <a:p>
+            <a:endParaRPr lang="en-IN" sz="1600">
+              <a:latin typeface="Roboto" panose="02000000000000000000" pitchFamily="2" charset="0"/>
+              <a:ea typeface="Roboto" panose="02000000000000000000" pitchFamily="2" charset="0"/>
+            </a:endParaRPr>
+          </a:p>
+          <a:p>
+            <a:r>
+              <a:rPr lang="en-IN" sz="1600">
+                <a:latin typeface="Roboto" panose="02000000000000000000" pitchFamily="2" charset="0"/>
+                <a:ea typeface="Roboto" panose="02000000000000000000" pitchFamily="2" charset="0"/>
+              </a:rPr>
+              <a:t>Just sign up, create user, get link and use in the app</a:t>
+            </a:r>
+          </a:p>
+          <a:p>
+            <a:endParaRPr lang="en-IN" sz="1600">
+              <a:latin typeface="Roboto" panose="02000000000000000000" pitchFamily="2" charset="0"/>
+              <a:ea typeface="Roboto" panose="02000000000000000000" pitchFamily="2" charset="0"/>
+            </a:endParaRPr>
+          </a:p>
+          <a:p>
+            <a:endParaRPr lang="en-IN" sz="1600">
+              <a:latin typeface="Roboto" panose="02000000000000000000" pitchFamily="2" charset="0"/>
+              <a:ea typeface="Roboto" panose="02000000000000000000" pitchFamily="2" charset="0"/>
+            </a:endParaRPr>
+          </a:p>
+          <a:p>
+            <a:r>
+              <a:rPr lang="en-IN" sz="1600">
+                <a:latin typeface="Roboto" panose="02000000000000000000" pitchFamily="2" charset="0"/>
+                <a:ea typeface="Roboto" panose="02000000000000000000" pitchFamily="2" charset="0"/>
+              </a:rPr>
+              <a:t>Heroku deployment is as usual.</a:t>
+            </a:r>
+          </a:p>
+        </p:txBody>
+      </p:sp>
+      <p:sp>
+        <p:nvSpPr>
+          <p:cNvPr id="19" name="Rectangle 18">
+            <a:extLst>
+              <a:ext uri="{FF2B5EF4-FFF2-40B4-BE49-F238E27FC236}">
+                <a16:creationId xmlns:a16="http://schemas.microsoft.com/office/drawing/2014/main" id="{F15B1B56-71D8-4CA9-B790-2BAEAF776AA7}"/>
+              </a:ext>
+            </a:extLst>
+          </p:cNvPr>
+          <p:cNvSpPr/>
+          <p:nvPr/>
+        </p:nvSpPr>
+        <p:spPr>
+          <a:xfrm>
+            <a:off x="7808867" y="727998"/>
+            <a:ext cx="1439542" cy="164251"/>
+          </a:xfrm>
+          <a:prstGeom prst="rect">
+            <a:avLst/>
+          </a:prstGeom>
+          <a:solidFill>
+            <a:srgbClr val="FFFF00">
+              <a:alpha val="25000"/>
+            </a:srgbClr>
+          </a:solidFill>
+          <a:ln>
+            <a:noFill/>
+          </a:ln>
+        </p:spPr>
+        <p:style>
+          <a:lnRef idx="2">
+            <a:schemeClr val="accent1">
+              <a:shade val="50000"/>
+            </a:schemeClr>
+          </a:lnRef>
+          <a:fillRef idx="1">
+            <a:schemeClr val="accent1"/>
+          </a:fillRef>
+          <a:effectRef idx="0">
+            <a:schemeClr val="accent1"/>
+          </a:effectRef>
+          <a:fontRef idx="minor">
+            <a:schemeClr val="lt1"/>
+          </a:fontRef>
+        </p:style>
+        <p:txBody>
+          <a:bodyPr rtlCol="0" anchor="ctr"/>
+          <a:lstStyle/>
+          <a:p>
+            <a:pPr algn="ctr"/>
+            <a:endParaRPr lang="en-IN"/>
+          </a:p>
+        </p:txBody>
+      </p:sp>
+      <p:sp>
+        <p:nvSpPr>
+          <p:cNvPr id="25" name="Rectangle 24">
+            <a:extLst>
+              <a:ext uri="{FF2B5EF4-FFF2-40B4-BE49-F238E27FC236}">
+                <a16:creationId xmlns:a16="http://schemas.microsoft.com/office/drawing/2014/main" id="{F798FF56-F0AB-4E2A-B92E-84D042164B1E}"/>
+              </a:ext>
+            </a:extLst>
+          </p:cNvPr>
+          <p:cNvSpPr/>
+          <p:nvPr/>
+        </p:nvSpPr>
+        <p:spPr>
+          <a:xfrm>
+            <a:off x="8783783" y="2438018"/>
+            <a:ext cx="665018" cy="185109"/>
+          </a:xfrm>
+          <a:prstGeom prst="rect">
+            <a:avLst/>
+          </a:prstGeom>
+          <a:solidFill>
+            <a:srgbClr val="FFFF00">
+              <a:alpha val="25000"/>
+            </a:srgbClr>
+          </a:solidFill>
+          <a:ln>
+            <a:noFill/>
+          </a:ln>
+        </p:spPr>
+        <p:style>
+          <a:lnRef idx="2">
+            <a:schemeClr val="accent1">
+              <a:shade val="50000"/>
+            </a:schemeClr>
+          </a:lnRef>
+          <a:fillRef idx="1">
+            <a:schemeClr val="accent1"/>
+          </a:fillRef>
+          <a:effectRef idx="0">
+            <a:schemeClr val="accent1"/>
+          </a:effectRef>
+          <a:fontRef idx="minor">
+            <a:schemeClr val="lt1"/>
+          </a:fontRef>
+        </p:style>
+        <p:txBody>
+          <a:bodyPr rtlCol="0" anchor="ctr"/>
+          <a:lstStyle/>
+          <a:p>
+            <a:pPr algn="ctr"/>
+            <a:endParaRPr lang="en-IN"/>
+          </a:p>
+        </p:txBody>
+      </p:sp>
+      <p:sp>
+        <p:nvSpPr>
+          <p:cNvPr id="26" name="Rectangle 25">
+            <a:extLst>
+              <a:ext uri="{FF2B5EF4-FFF2-40B4-BE49-F238E27FC236}">
+                <a16:creationId xmlns:a16="http://schemas.microsoft.com/office/drawing/2014/main" id="{267D5DC7-C196-4B41-BE15-723855E87F6C}"/>
+              </a:ext>
+            </a:extLst>
+          </p:cNvPr>
+          <p:cNvSpPr/>
+          <p:nvPr/>
+        </p:nvSpPr>
+        <p:spPr>
+          <a:xfrm>
+            <a:off x="8686801" y="3209254"/>
+            <a:ext cx="665018" cy="185109"/>
+          </a:xfrm>
+          <a:prstGeom prst="rect">
+            <a:avLst/>
+          </a:prstGeom>
+          <a:solidFill>
+            <a:srgbClr val="FFFF00">
+              <a:alpha val="25000"/>
+            </a:srgbClr>
+          </a:solidFill>
+          <a:ln>
+            <a:noFill/>
+          </a:ln>
+        </p:spPr>
+        <p:style>
+          <a:lnRef idx="2">
+            <a:schemeClr val="accent1">
+              <a:shade val="50000"/>
+            </a:schemeClr>
+          </a:lnRef>
+          <a:fillRef idx="1">
+            <a:schemeClr val="accent1"/>
+          </a:fillRef>
+          <a:effectRef idx="0">
+            <a:schemeClr val="accent1"/>
+          </a:effectRef>
+          <a:fontRef idx="minor">
+            <a:schemeClr val="lt1"/>
+          </a:fontRef>
+        </p:style>
+        <p:txBody>
+          <a:bodyPr rtlCol="0" anchor="ctr"/>
+          <a:lstStyle/>
+          <a:p>
+            <a:pPr algn="ctr"/>
+            <a:endParaRPr lang="en-IN"/>
+          </a:p>
+        </p:txBody>
+      </p:sp>
+      <p:sp>
+        <p:nvSpPr>
+          <p:cNvPr id="27" name="Rectangle 26">
+            <a:extLst>
+              <a:ext uri="{FF2B5EF4-FFF2-40B4-BE49-F238E27FC236}">
+                <a16:creationId xmlns:a16="http://schemas.microsoft.com/office/drawing/2014/main" id="{036B0D79-F49E-4555-8F05-70BB24401860}"/>
+              </a:ext>
+            </a:extLst>
+          </p:cNvPr>
+          <p:cNvSpPr/>
+          <p:nvPr/>
+        </p:nvSpPr>
+        <p:spPr>
+          <a:xfrm>
+            <a:off x="8686801" y="4076341"/>
+            <a:ext cx="665018" cy="185109"/>
+          </a:xfrm>
+          <a:prstGeom prst="rect">
+            <a:avLst/>
+          </a:prstGeom>
+          <a:solidFill>
+            <a:srgbClr val="FFFF00">
+              <a:alpha val="25000"/>
+            </a:srgbClr>
+          </a:solidFill>
+          <a:ln>
+            <a:noFill/>
+          </a:ln>
+        </p:spPr>
+        <p:style>
+          <a:lnRef idx="2">
+            <a:schemeClr val="accent1">
+              <a:shade val="50000"/>
+            </a:schemeClr>
+          </a:lnRef>
+          <a:fillRef idx="1">
+            <a:schemeClr val="accent1"/>
+          </a:fillRef>
+          <a:effectRef idx="0">
+            <a:schemeClr val="accent1"/>
+          </a:effectRef>
+          <a:fontRef idx="minor">
+            <a:schemeClr val="lt1"/>
+          </a:fontRef>
+        </p:style>
+        <p:txBody>
+          <a:bodyPr rtlCol="0" anchor="ctr"/>
+          <a:lstStyle/>
+          <a:p>
+            <a:pPr algn="ctr"/>
+            <a:endParaRPr lang="en-IN"/>
+          </a:p>
+        </p:txBody>
+      </p:sp>
+      <p:pic>
+        <p:nvPicPr>
+          <p:cNvPr id="8" name="Picture 7">
+            <a:extLst>
+              <a:ext uri="{FF2B5EF4-FFF2-40B4-BE49-F238E27FC236}">
+                <a16:creationId xmlns:a16="http://schemas.microsoft.com/office/drawing/2014/main" id="{8B3F1475-5DB0-4D61-89DB-0FF5DB494A6B}"/>
+              </a:ext>
+            </a:extLst>
+          </p:cNvPr>
+          <p:cNvPicPr>
+            <a:picLocks noChangeAspect="1"/>
+          </p:cNvPicPr>
+          <p:nvPr/>
+        </p:nvPicPr>
+        <p:blipFill rotWithShape="1">
+          <a:blip r:embed="rId3">
+            <a:extLst>
+              <a:ext uri="{28A0092B-C50C-407E-A947-70E740481C1C}">
+                <a14:useLocalDpi xmlns:a14="http://schemas.microsoft.com/office/drawing/2010/main" val="0"/>
+              </a:ext>
+            </a:extLst>
+          </a:blip>
+          <a:srcRect r="50221" b="38869"/>
+          <a:stretch/>
+        </p:blipFill>
+        <p:spPr>
+          <a:xfrm>
+            <a:off x="6705627" y="4729776"/>
+            <a:ext cx="4627366" cy="1963184"/>
+          </a:xfrm>
+          <a:prstGeom prst="rect">
+            <a:avLst/>
+          </a:prstGeom>
+        </p:spPr>
+      </p:pic>
+      <p:sp>
+        <p:nvSpPr>
+          <p:cNvPr id="9" name="Arrow: Bent 8">
+            <a:extLst>
+              <a:ext uri="{FF2B5EF4-FFF2-40B4-BE49-F238E27FC236}">
+                <a16:creationId xmlns:a16="http://schemas.microsoft.com/office/drawing/2014/main" id="{BDC23366-9F09-4858-B14B-31CE9B95FD89}"/>
+              </a:ext>
+            </a:extLst>
+          </p:cNvPr>
+          <p:cNvSpPr/>
+          <p:nvPr/>
+        </p:nvSpPr>
+        <p:spPr>
+          <a:xfrm rot="16200000" flipH="1">
+            <a:off x="7043823" y="3956650"/>
+            <a:ext cx="531091" cy="609600"/>
+          </a:xfrm>
+          <a:prstGeom prst="bentArrow">
+            <a:avLst/>
+          </a:prstGeom>
+        </p:spPr>
+        <p:style>
+          <a:lnRef idx="2">
+            <a:schemeClr val="accent1">
+              <a:shade val="50000"/>
+            </a:schemeClr>
+          </a:lnRef>
+          <a:fillRef idx="1">
+            <a:schemeClr val="accent1"/>
+          </a:fillRef>
+          <a:effectRef idx="0">
+            <a:schemeClr val="accent1"/>
+          </a:effectRef>
+          <a:fontRef idx="minor">
+            <a:schemeClr val="lt1"/>
+          </a:fontRef>
+        </p:style>
+        <p:txBody>
+          <a:bodyPr rtlCol="0" anchor="ctr"/>
+          <a:lstStyle/>
+          <a:p>
+            <a:pPr algn="ctr"/>
+            <a:endParaRPr lang="en-IN">
+              <a:solidFill>
+                <a:schemeClr val="tx1"/>
+              </a:solidFill>
+            </a:endParaRPr>
+          </a:p>
+        </p:txBody>
+      </p:sp>
+    </p:spTree>
+    <p:extLst>
+      <p:ext uri="{BB962C8B-B14F-4D97-AF65-F5344CB8AC3E}">
+        <p14:creationId xmlns:p14="http://schemas.microsoft.com/office/powerpoint/2010/main" val="4227192373"/>
+      </p:ext>
+    </p:extLst>
+  </p:cSld>
+  <p:clrMapOvr>
+    <a:masterClrMapping/>
+  </p:clrMapOvr>
+</p:sld>
+</file>
+
 <file path=ppt/slides/slide4.xml><?xml version="1.0" encoding="utf-8"?>
 <p:sld xmlns:a="http://schemas.openxmlformats.org/drawingml/2006/main" xmlns:r="http://schemas.openxmlformats.org/officeDocument/2006/relationships" xmlns:p="http://schemas.openxmlformats.org/presentationml/2006/main">
   <p:cSld>

</xml_diff>